<commit_message>
Layout and last corrections
</commit_message>
<xml_diff>
--- a/Skizzen/SkizzenBA.pptx
+++ b/Skizzen/SkizzenBA.pptx
@@ -264,7 +264,7 @@
           <a:p>
             <a:fld id="{45319B7D-2E26-438D-B6F2-51FA7530014F}" type="datetimeFigureOut">
               <a:rPr lang="de-DE" smtClean="0"/>
-              <a:t>21.08.2019</a:t>
+              <a:t>22.08.2019</a:t>
             </a:fld>
             <a:endParaRPr lang="de-DE"/>
           </a:p>
@@ -462,7 +462,7 @@
           <a:p>
             <a:fld id="{45319B7D-2E26-438D-B6F2-51FA7530014F}" type="datetimeFigureOut">
               <a:rPr lang="de-DE" smtClean="0"/>
-              <a:t>21.08.2019</a:t>
+              <a:t>22.08.2019</a:t>
             </a:fld>
             <a:endParaRPr lang="de-DE"/>
           </a:p>
@@ -670,7 +670,7 @@
           <a:p>
             <a:fld id="{45319B7D-2E26-438D-B6F2-51FA7530014F}" type="datetimeFigureOut">
               <a:rPr lang="de-DE" smtClean="0"/>
-              <a:t>21.08.2019</a:t>
+              <a:t>22.08.2019</a:t>
             </a:fld>
             <a:endParaRPr lang="de-DE"/>
           </a:p>
@@ -868,7 +868,7 @@
           <a:p>
             <a:fld id="{45319B7D-2E26-438D-B6F2-51FA7530014F}" type="datetimeFigureOut">
               <a:rPr lang="de-DE" smtClean="0"/>
-              <a:t>21.08.2019</a:t>
+              <a:t>22.08.2019</a:t>
             </a:fld>
             <a:endParaRPr lang="de-DE"/>
           </a:p>
@@ -1143,7 +1143,7 @@
           <a:p>
             <a:fld id="{45319B7D-2E26-438D-B6F2-51FA7530014F}" type="datetimeFigureOut">
               <a:rPr lang="de-DE" smtClean="0"/>
-              <a:t>21.08.2019</a:t>
+              <a:t>22.08.2019</a:t>
             </a:fld>
             <a:endParaRPr lang="de-DE"/>
           </a:p>
@@ -1408,7 +1408,7 @@
           <a:p>
             <a:fld id="{45319B7D-2E26-438D-B6F2-51FA7530014F}" type="datetimeFigureOut">
               <a:rPr lang="de-DE" smtClean="0"/>
-              <a:t>21.08.2019</a:t>
+              <a:t>22.08.2019</a:t>
             </a:fld>
             <a:endParaRPr lang="de-DE"/>
           </a:p>
@@ -1820,7 +1820,7 @@
           <a:p>
             <a:fld id="{45319B7D-2E26-438D-B6F2-51FA7530014F}" type="datetimeFigureOut">
               <a:rPr lang="de-DE" smtClean="0"/>
-              <a:t>21.08.2019</a:t>
+              <a:t>22.08.2019</a:t>
             </a:fld>
             <a:endParaRPr lang="de-DE"/>
           </a:p>
@@ -1961,7 +1961,7 @@
           <a:p>
             <a:fld id="{45319B7D-2E26-438D-B6F2-51FA7530014F}" type="datetimeFigureOut">
               <a:rPr lang="de-DE" smtClean="0"/>
-              <a:t>21.08.2019</a:t>
+              <a:t>22.08.2019</a:t>
             </a:fld>
             <a:endParaRPr lang="de-DE"/>
           </a:p>
@@ -2074,7 +2074,7 @@
           <a:p>
             <a:fld id="{45319B7D-2E26-438D-B6F2-51FA7530014F}" type="datetimeFigureOut">
               <a:rPr lang="de-DE" smtClean="0"/>
-              <a:t>21.08.2019</a:t>
+              <a:t>22.08.2019</a:t>
             </a:fld>
             <a:endParaRPr lang="de-DE"/>
           </a:p>
@@ -2385,7 +2385,7 @@
           <a:p>
             <a:fld id="{45319B7D-2E26-438D-B6F2-51FA7530014F}" type="datetimeFigureOut">
               <a:rPr lang="de-DE" smtClean="0"/>
-              <a:t>21.08.2019</a:t>
+              <a:t>22.08.2019</a:t>
             </a:fld>
             <a:endParaRPr lang="de-DE"/>
           </a:p>
@@ -2673,7 +2673,7 @@
           <a:p>
             <a:fld id="{45319B7D-2E26-438D-B6F2-51FA7530014F}" type="datetimeFigureOut">
               <a:rPr lang="de-DE" smtClean="0"/>
-              <a:t>21.08.2019</a:t>
+              <a:t>22.08.2019</a:t>
             </a:fld>
             <a:endParaRPr lang="de-DE"/>
           </a:p>
@@ -2914,7 +2914,7 @@
           <a:p>
             <a:fld id="{45319B7D-2E26-438D-B6F2-51FA7530014F}" type="datetimeFigureOut">
               <a:rPr lang="de-DE" smtClean="0"/>
-              <a:t>21.08.2019</a:t>
+              <a:t>22.08.2019</a:t>
             </a:fld>
             <a:endParaRPr lang="de-DE"/>
           </a:p>
@@ -3345,7 +3345,7 @@
         </p:nvSpPr>
         <p:spPr>
           <a:xfrm>
-            <a:off x="8901841" y="1960988"/>
+            <a:off x="8083514" y="1944893"/>
             <a:ext cx="710213" cy="585926"/>
           </a:xfrm>
           <a:prstGeom prst="rect">
@@ -3389,7 +3389,7 @@
         </p:nvSpPr>
         <p:spPr>
           <a:xfrm>
-            <a:off x="8901841" y="2535077"/>
+            <a:off x="8083514" y="2518982"/>
             <a:ext cx="710213" cy="585926"/>
           </a:xfrm>
           <a:prstGeom prst="rect">
@@ -3433,7 +3433,7 @@
         </p:nvSpPr>
         <p:spPr>
           <a:xfrm>
-            <a:off x="8901841" y="3121003"/>
+            <a:off x="8083514" y="3104908"/>
             <a:ext cx="710213" cy="585926"/>
           </a:xfrm>
           <a:prstGeom prst="rect">
@@ -3477,7 +3477,7 @@
         </p:nvSpPr>
         <p:spPr>
           <a:xfrm>
-            <a:off x="8901841" y="3695092"/>
+            <a:off x="8083514" y="3678997"/>
             <a:ext cx="710213" cy="585926"/>
           </a:xfrm>
           <a:prstGeom prst="rect">
@@ -3823,7 +3823,7 @@
         </p:nvSpPr>
         <p:spPr>
           <a:xfrm>
-            <a:off x="9076947" y="2648995"/>
+            <a:off x="8258620" y="2632900"/>
             <a:ext cx="360000" cy="360000"/>
           </a:xfrm>
           <a:prstGeom prst="ellipse">
@@ -4405,19 +4405,19 @@
       </p:sp>
       <p:sp>
         <p:nvSpPr>
-          <p:cNvPr id="60" name="Ellipse 59">
-            <a:extLst>
-              <a:ext uri="{FF2B5EF4-FFF2-40B4-BE49-F238E27FC236}">
-                <a16:creationId xmlns:a16="http://schemas.microsoft.com/office/drawing/2014/main" id="{41ABADC8-CFFD-494B-A62E-4CC96B154753}"/>
-              </a:ext>
-            </a:extLst>
-          </p:cNvPr>
-          <p:cNvSpPr/>
-          <p:nvPr/>
-        </p:nvSpPr>
-        <p:spPr>
-          <a:xfrm>
-            <a:off x="7879885" y="2744908"/>
+          <p:cNvPr id="61" name="Ellipse 60">
+            <a:extLst>
+              <a:ext uri="{FF2B5EF4-FFF2-40B4-BE49-F238E27FC236}">
+                <a16:creationId xmlns:a16="http://schemas.microsoft.com/office/drawing/2014/main" id="{9567127D-F39A-4439-9B36-A1A1E14B6FAA}"/>
+              </a:ext>
+            </a:extLst>
+          </p:cNvPr>
+          <p:cNvSpPr/>
+          <p:nvPr/>
+        </p:nvSpPr>
+        <p:spPr>
+          <a:xfrm>
+            <a:off x="5931128" y="5107812"/>
             <a:ext cx="360000" cy="360000"/>
           </a:xfrm>
           <a:prstGeom prst="ellipse">
@@ -4459,19 +4459,19 @@
       </p:sp>
       <p:sp>
         <p:nvSpPr>
-          <p:cNvPr id="61" name="Ellipse 60">
-            <a:extLst>
-              <a:ext uri="{FF2B5EF4-FFF2-40B4-BE49-F238E27FC236}">
-                <a16:creationId xmlns:a16="http://schemas.microsoft.com/office/drawing/2014/main" id="{9567127D-F39A-4439-9B36-A1A1E14B6FAA}"/>
-              </a:ext>
-            </a:extLst>
-          </p:cNvPr>
-          <p:cNvSpPr/>
-          <p:nvPr/>
-        </p:nvSpPr>
-        <p:spPr>
-          <a:xfrm>
-            <a:off x="5931128" y="5107812"/>
+          <p:cNvPr id="62" name="Ellipse 61">
+            <a:extLst>
+              <a:ext uri="{FF2B5EF4-FFF2-40B4-BE49-F238E27FC236}">
+                <a16:creationId xmlns:a16="http://schemas.microsoft.com/office/drawing/2014/main" id="{F5BF99F7-ADA2-46AF-BA51-49C70328735D}"/>
+              </a:ext>
+            </a:extLst>
+          </p:cNvPr>
+          <p:cNvSpPr/>
+          <p:nvPr/>
+        </p:nvSpPr>
+        <p:spPr>
+          <a:xfrm>
+            <a:off x="4451917" y="4075956"/>
             <a:ext cx="360000" cy="360000"/>
           </a:xfrm>
           <a:prstGeom prst="ellipse">
@@ -4513,19 +4513,19 @@
       </p:sp>
       <p:sp>
         <p:nvSpPr>
-          <p:cNvPr id="62" name="Ellipse 61">
-            <a:extLst>
-              <a:ext uri="{FF2B5EF4-FFF2-40B4-BE49-F238E27FC236}">
-                <a16:creationId xmlns:a16="http://schemas.microsoft.com/office/drawing/2014/main" id="{F5BF99F7-ADA2-46AF-BA51-49C70328735D}"/>
-              </a:ext>
-            </a:extLst>
-          </p:cNvPr>
-          <p:cNvSpPr/>
-          <p:nvPr/>
-        </p:nvSpPr>
-        <p:spPr>
-          <a:xfrm>
-            <a:off x="4451917" y="4075956"/>
+          <p:cNvPr id="63" name="Ellipse 62">
+            <a:extLst>
+              <a:ext uri="{FF2B5EF4-FFF2-40B4-BE49-F238E27FC236}">
+                <a16:creationId xmlns:a16="http://schemas.microsoft.com/office/drawing/2014/main" id="{FABEED40-A15A-4381-83D9-C884AD999B9B}"/>
+              </a:ext>
+            </a:extLst>
+          </p:cNvPr>
+          <p:cNvSpPr/>
+          <p:nvPr/>
+        </p:nvSpPr>
+        <p:spPr>
+          <a:xfrm>
+            <a:off x="8222096" y="1059369"/>
             <a:ext cx="360000" cy="360000"/>
           </a:xfrm>
           <a:prstGeom prst="ellipse">
@@ -4567,19 +4567,19 @@
       </p:sp>
       <p:sp>
         <p:nvSpPr>
-          <p:cNvPr id="63" name="Ellipse 62">
-            <a:extLst>
-              <a:ext uri="{FF2B5EF4-FFF2-40B4-BE49-F238E27FC236}">
-                <a16:creationId xmlns:a16="http://schemas.microsoft.com/office/drawing/2014/main" id="{FABEED40-A15A-4381-83D9-C884AD999B9B}"/>
-              </a:ext>
-            </a:extLst>
-          </p:cNvPr>
-          <p:cNvSpPr/>
-          <p:nvPr/>
-        </p:nvSpPr>
-        <p:spPr>
-          <a:xfrm>
-            <a:off x="9040423" y="1075464"/>
+          <p:cNvPr id="64" name="Ellipse 63">
+            <a:extLst>
+              <a:ext uri="{FF2B5EF4-FFF2-40B4-BE49-F238E27FC236}">
+                <a16:creationId xmlns:a16="http://schemas.microsoft.com/office/drawing/2014/main" id="{6BF8311A-7C24-42BD-B8BD-170B3D5E3113}"/>
+              </a:ext>
+            </a:extLst>
+          </p:cNvPr>
+          <p:cNvSpPr/>
+          <p:nvPr/>
+        </p:nvSpPr>
+        <p:spPr>
+          <a:xfrm>
+            <a:off x="7850438" y="5224184"/>
             <a:ext cx="360000" cy="360000"/>
           </a:xfrm>
           <a:prstGeom prst="ellipse">
@@ -4621,19 +4621,19 @@
       </p:sp>
       <p:sp>
         <p:nvSpPr>
-          <p:cNvPr id="64" name="Ellipse 63">
-            <a:extLst>
-              <a:ext uri="{FF2B5EF4-FFF2-40B4-BE49-F238E27FC236}">
-                <a16:creationId xmlns:a16="http://schemas.microsoft.com/office/drawing/2014/main" id="{6BF8311A-7C24-42BD-B8BD-170B3D5E3113}"/>
-              </a:ext>
-            </a:extLst>
-          </p:cNvPr>
-          <p:cNvSpPr/>
-          <p:nvPr/>
-        </p:nvSpPr>
-        <p:spPr>
-          <a:xfrm>
-            <a:off x="7850438" y="5224184"/>
+          <p:cNvPr id="65" name="Ellipse 64">
+            <a:extLst>
+              <a:ext uri="{FF2B5EF4-FFF2-40B4-BE49-F238E27FC236}">
+                <a16:creationId xmlns:a16="http://schemas.microsoft.com/office/drawing/2014/main" id="{AE1C755E-944B-458B-820C-76824CDEFE9E}"/>
+              </a:ext>
+            </a:extLst>
+          </p:cNvPr>
+          <p:cNvSpPr/>
+          <p:nvPr/>
+        </p:nvSpPr>
+        <p:spPr>
+          <a:xfrm>
+            <a:off x="6965002" y="4402268"/>
             <a:ext cx="360000" cy="360000"/>
           </a:xfrm>
           <a:prstGeom prst="ellipse">
@@ -4675,60 +4675,6 @@
       </p:sp>
       <p:sp>
         <p:nvSpPr>
-          <p:cNvPr id="65" name="Ellipse 64">
-            <a:extLst>
-              <a:ext uri="{FF2B5EF4-FFF2-40B4-BE49-F238E27FC236}">
-                <a16:creationId xmlns:a16="http://schemas.microsoft.com/office/drawing/2014/main" id="{AE1C755E-944B-458B-820C-76824CDEFE9E}"/>
-              </a:ext>
-            </a:extLst>
-          </p:cNvPr>
-          <p:cNvSpPr/>
-          <p:nvPr/>
-        </p:nvSpPr>
-        <p:spPr>
-          <a:xfrm>
-            <a:off x="6965002" y="4402268"/>
-            <a:ext cx="360000" cy="360000"/>
-          </a:xfrm>
-          <a:prstGeom prst="ellipse">
-            <a:avLst/>
-          </a:prstGeom>
-          <a:solidFill>
-            <a:srgbClr val="FF0000"/>
-          </a:solidFill>
-          <a:ln>
-            <a:solidFill>
-              <a:srgbClr val="FF0000"/>
-            </a:solidFill>
-          </a:ln>
-        </p:spPr>
-        <p:style>
-          <a:lnRef idx="2">
-            <a:schemeClr val="accent1">
-              <a:shade val="50000"/>
-            </a:schemeClr>
-          </a:lnRef>
-          <a:fillRef idx="1">
-            <a:schemeClr val="accent1"/>
-          </a:fillRef>
-          <a:effectRef idx="0">
-            <a:schemeClr val="accent1"/>
-          </a:effectRef>
-          <a:fontRef idx="minor">
-            <a:schemeClr val="lt1"/>
-          </a:fontRef>
-        </p:style>
-        <p:txBody>
-          <a:bodyPr rtlCol="0" anchor="ctr"/>
-          <a:lstStyle/>
-          <a:p>
-            <a:pPr algn="ctr"/>
-            <a:endParaRPr lang="de-DE"/>
-          </a:p>
-        </p:txBody>
-      </p:sp>
-      <p:sp>
-        <p:nvSpPr>
           <p:cNvPr id="66" name="Ellipse 65">
             <a:extLst>
               <a:ext uri="{FF2B5EF4-FFF2-40B4-BE49-F238E27FC236}">
@@ -4741,7 +4687,7 @@
         </p:nvSpPr>
         <p:spPr>
           <a:xfrm>
-            <a:off x="9076947" y="3793688"/>
+            <a:off x="8258620" y="3777593"/>
             <a:ext cx="360000" cy="360000"/>
           </a:xfrm>
           <a:prstGeom prst="ellipse">
@@ -4791,7 +4737,7 @@
         <p:spPr>
           <a:xfrm flipH="1" flipV="1">
             <a:off x="4613274" y="1199912"/>
-            <a:ext cx="4516394" cy="2646497"/>
+            <a:ext cx="3698067" cy="2630402"/>
           </a:xfrm>
           <a:prstGeom prst="line">
             <a:avLst/>
@@ -4830,8 +4776,8 @@
         </p:nvCxnSpPr>
         <p:spPr>
           <a:xfrm flipH="1">
-            <a:off x="4548828" y="4100967"/>
-            <a:ext cx="4580840" cy="2136562"/>
+            <a:off x="4548828" y="4084872"/>
+            <a:ext cx="3762513" cy="2152657"/>
           </a:xfrm>
           <a:prstGeom prst="line">
             <a:avLst/>
@@ -5918,19 +5864,19 @@
       </p:sp>
       <p:sp>
         <p:nvSpPr>
-          <p:cNvPr id="10" name="Ellipse 9">
-            <a:extLst>
-              <a:ext uri="{FF2B5EF4-FFF2-40B4-BE49-F238E27FC236}">
-                <a16:creationId xmlns:a16="http://schemas.microsoft.com/office/drawing/2014/main" id="{5444AF3F-B736-4552-AFE0-B2DB0BF0AD2B}"/>
-              </a:ext>
-            </a:extLst>
-          </p:cNvPr>
-          <p:cNvSpPr/>
-          <p:nvPr/>
-        </p:nvSpPr>
-        <p:spPr>
-          <a:xfrm>
-            <a:off x="6196116" y="4759810"/>
+          <p:cNvPr id="11" name="Ellipse 10">
+            <a:extLst>
+              <a:ext uri="{FF2B5EF4-FFF2-40B4-BE49-F238E27FC236}">
+                <a16:creationId xmlns:a16="http://schemas.microsoft.com/office/drawing/2014/main" id="{89B9D531-41C2-4991-8D68-4505C3974C5B}"/>
+              </a:ext>
+            </a:extLst>
+          </p:cNvPr>
+          <p:cNvSpPr/>
+          <p:nvPr/>
+        </p:nvSpPr>
+        <p:spPr>
+          <a:xfrm>
+            <a:off x="5741006" y="4543232"/>
             <a:ext cx="360000" cy="360000"/>
           </a:xfrm>
           <a:prstGeom prst="ellipse">
@@ -5972,19 +5918,19 @@
       </p:sp>
       <p:sp>
         <p:nvSpPr>
-          <p:cNvPr id="11" name="Ellipse 10">
-            <a:extLst>
-              <a:ext uri="{FF2B5EF4-FFF2-40B4-BE49-F238E27FC236}">
-                <a16:creationId xmlns:a16="http://schemas.microsoft.com/office/drawing/2014/main" id="{89B9D531-41C2-4991-8D68-4505C3974C5B}"/>
-              </a:ext>
-            </a:extLst>
-          </p:cNvPr>
-          <p:cNvSpPr/>
-          <p:nvPr/>
-        </p:nvSpPr>
-        <p:spPr>
-          <a:xfrm>
-            <a:off x="5741006" y="4543232"/>
+          <p:cNvPr id="12" name="Ellipse 11">
+            <a:extLst>
+              <a:ext uri="{FF2B5EF4-FFF2-40B4-BE49-F238E27FC236}">
+                <a16:creationId xmlns:a16="http://schemas.microsoft.com/office/drawing/2014/main" id="{F6B414B5-5772-4A91-B282-B811C2C7624D}"/>
+              </a:ext>
+            </a:extLst>
+          </p:cNvPr>
+          <p:cNvSpPr/>
+          <p:nvPr/>
+        </p:nvSpPr>
+        <p:spPr>
+          <a:xfrm>
+            <a:off x="4895337" y="4199230"/>
             <a:ext cx="360000" cy="360000"/>
           </a:xfrm>
           <a:prstGeom prst="ellipse">
@@ -6026,19 +5972,19 @@
       </p:sp>
       <p:sp>
         <p:nvSpPr>
-          <p:cNvPr id="12" name="Ellipse 11">
-            <a:extLst>
-              <a:ext uri="{FF2B5EF4-FFF2-40B4-BE49-F238E27FC236}">
-                <a16:creationId xmlns:a16="http://schemas.microsoft.com/office/drawing/2014/main" id="{F6B414B5-5772-4A91-B282-B811C2C7624D}"/>
-              </a:ext>
-            </a:extLst>
-          </p:cNvPr>
-          <p:cNvSpPr/>
-          <p:nvPr/>
-        </p:nvSpPr>
-        <p:spPr>
-          <a:xfrm>
-            <a:off x="4895337" y="4199230"/>
+          <p:cNvPr id="13" name="Ellipse 12">
+            <a:extLst>
+              <a:ext uri="{FF2B5EF4-FFF2-40B4-BE49-F238E27FC236}">
+                <a16:creationId xmlns:a16="http://schemas.microsoft.com/office/drawing/2014/main" id="{FB7860A6-85AB-4FA9-986F-C11793EFE118}"/>
+              </a:ext>
+            </a:extLst>
+          </p:cNvPr>
+          <p:cNvSpPr/>
+          <p:nvPr/>
+        </p:nvSpPr>
+        <p:spPr>
+          <a:xfrm>
+            <a:off x="5332773" y="3727932"/>
             <a:ext cx="360000" cy="360000"/>
           </a:xfrm>
           <a:prstGeom prst="ellipse">
@@ -6080,19 +6026,19 @@
       </p:sp>
       <p:sp>
         <p:nvSpPr>
-          <p:cNvPr id="13" name="Ellipse 12">
-            <a:extLst>
-              <a:ext uri="{FF2B5EF4-FFF2-40B4-BE49-F238E27FC236}">
-                <a16:creationId xmlns:a16="http://schemas.microsoft.com/office/drawing/2014/main" id="{FB7860A6-85AB-4FA9-986F-C11793EFE118}"/>
-              </a:ext>
-            </a:extLst>
-          </p:cNvPr>
-          <p:cNvSpPr/>
-          <p:nvPr/>
-        </p:nvSpPr>
-        <p:spPr>
-          <a:xfrm>
-            <a:off x="5332773" y="3727932"/>
+          <p:cNvPr id="15" name="Ellipse 14">
+            <a:extLst>
+              <a:ext uri="{FF2B5EF4-FFF2-40B4-BE49-F238E27FC236}">
+                <a16:creationId xmlns:a16="http://schemas.microsoft.com/office/drawing/2014/main" id="{585D2F81-5E6E-46F1-81F4-0CD593104CF0}"/>
+              </a:ext>
+            </a:extLst>
+          </p:cNvPr>
+          <p:cNvSpPr/>
+          <p:nvPr/>
+        </p:nvSpPr>
+        <p:spPr>
+          <a:xfrm>
+            <a:off x="5695366" y="2499281"/>
             <a:ext cx="360000" cy="360000"/>
           </a:xfrm>
           <a:prstGeom prst="ellipse">
@@ -6134,19 +6080,19 @@
       </p:sp>
       <p:sp>
         <p:nvSpPr>
-          <p:cNvPr id="15" name="Ellipse 14">
-            <a:extLst>
-              <a:ext uri="{FF2B5EF4-FFF2-40B4-BE49-F238E27FC236}">
-                <a16:creationId xmlns:a16="http://schemas.microsoft.com/office/drawing/2014/main" id="{585D2F81-5E6E-46F1-81F4-0CD593104CF0}"/>
-              </a:ext>
-            </a:extLst>
-          </p:cNvPr>
-          <p:cNvSpPr/>
-          <p:nvPr/>
-        </p:nvSpPr>
-        <p:spPr>
-          <a:xfrm>
-            <a:off x="5695366" y="2499281"/>
+          <p:cNvPr id="16" name="Ellipse 15">
+            <a:extLst>
+              <a:ext uri="{FF2B5EF4-FFF2-40B4-BE49-F238E27FC236}">
+                <a16:creationId xmlns:a16="http://schemas.microsoft.com/office/drawing/2014/main" id="{4B0D0B12-8B2C-43BB-94BE-6525F737D48F}"/>
+              </a:ext>
+            </a:extLst>
+          </p:cNvPr>
+          <p:cNvSpPr/>
+          <p:nvPr/>
+        </p:nvSpPr>
+        <p:spPr>
+          <a:xfrm>
+            <a:off x="5776782" y="1941906"/>
             <a:ext cx="360000" cy="360000"/>
           </a:xfrm>
           <a:prstGeom prst="ellipse">
@@ -6188,19 +6134,19 @@
       </p:sp>
       <p:sp>
         <p:nvSpPr>
-          <p:cNvPr id="16" name="Ellipse 15">
-            <a:extLst>
-              <a:ext uri="{FF2B5EF4-FFF2-40B4-BE49-F238E27FC236}">
-                <a16:creationId xmlns:a16="http://schemas.microsoft.com/office/drawing/2014/main" id="{4B0D0B12-8B2C-43BB-94BE-6525F737D48F}"/>
-              </a:ext>
-            </a:extLst>
-          </p:cNvPr>
-          <p:cNvSpPr/>
-          <p:nvPr/>
-        </p:nvSpPr>
-        <p:spPr>
-          <a:xfrm>
-            <a:off x="5776782" y="1941906"/>
+          <p:cNvPr id="17" name="Ellipse 16">
+            <a:extLst>
+              <a:ext uri="{FF2B5EF4-FFF2-40B4-BE49-F238E27FC236}">
+                <a16:creationId xmlns:a16="http://schemas.microsoft.com/office/drawing/2014/main" id="{0C2DCDCB-9B7E-4CE3-8FBF-C9F709E8C212}"/>
+              </a:ext>
+            </a:extLst>
+          </p:cNvPr>
+          <p:cNvSpPr/>
+          <p:nvPr/>
+        </p:nvSpPr>
+        <p:spPr>
+          <a:xfrm>
+            <a:off x="5848893" y="5101180"/>
             <a:ext cx="360000" cy="360000"/>
           </a:xfrm>
           <a:prstGeom prst="ellipse">
@@ -6240,21 +6186,60 @@
           </a:p>
         </p:txBody>
       </p:sp>
-      <p:sp>
-        <p:nvSpPr>
-          <p:cNvPr id="17" name="Ellipse 16">
-            <a:extLst>
-              <a:ext uri="{FF2B5EF4-FFF2-40B4-BE49-F238E27FC236}">
-                <a16:creationId xmlns:a16="http://schemas.microsoft.com/office/drawing/2014/main" id="{0C2DCDCB-9B7E-4CE3-8FBF-C9F709E8C212}"/>
-              </a:ext>
-            </a:extLst>
-          </p:cNvPr>
-          <p:cNvSpPr/>
-          <p:nvPr/>
-        </p:nvSpPr>
-        <p:spPr>
-          <a:xfrm>
-            <a:off x="5848893" y="5101180"/>
+      <p:cxnSp>
+        <p:nvCxnSpPr>
+          <p:cNvPr id="30" name="Gerader Verbinder 29">
+            <a:extLst>
+              <a:ext uri="{FF2B5EF4-FFF2-40B4-BE49-F238E27FC236}">
+                <a16:creationId xmlns:a16="http://schemas.microsoft.com/office/drawing/2014/main" id="{F76142DB-BC9D-4FC9-A1EC-D07725483C05}"/>
+              </a:ext>
+            </a:extLst>
+          </p:cNvPr>
+          <p:cNvCxnSpPr>
+            <a:cxnSpLocks/>
+          </p:cNvCxnSpPr>
+          <p:nvPr/>
+        </p:nvCxnSpPr>
+        <p:spPr>
+          <a:xfrm>
+            <a:off x="2774564" y="0"/>
+            <a:ext cx="0" cy="6924486"/>
+          </a:xfrm>
+          <a:prstGeom prst="line">
+            <a:avLst/>
+          </a:prstGeom>
+          <a:ln w="76200"/>
+        </p:spPr>
+        <p:style>
+          <a:lnRef idx="3">
+            <a:schemeClr val="accent3"/>
+          </a:lnRef>
+          <a:fillRef idx="0">
+            <a:schemeClr val="accent3"/>
+          </a:fillRef>
+          <a:effectRef idx="2">
+            <a:schemeClr val="accent3"/>
+          </a:effectRef>
+          <a:fontRef idx="minor">
+            <a:schemeClr val="tx1"/>
+          </a:fontRef>
+        </p:style>
+      </p:cxnSp>
+      <p:sp>
+        <p:nvSpPr>
+          <p:cNvPr id="53" name="Ellipse 52">
+            <a:extLst>
+              <a:ext uri="{FF2B5EF4-FFF2-40B4-BE49-F238E27FC236}">
+                <a16:creationId xmlns:a16="http://schemas.microsoft.com/office/drawing/2014/main" id="{59E707F2-24D4-4903-90C6-849F03103749}"/>
+              </a:ext>
+            </a:extLst>
+          </p:cNvPr>
+          <p:cNvSpPr/>
+          <p:nvPr/>
+        </p:nvSpPr>
+        <p:spPr>
+          <a:xfrm>
+            <a:off x="4218724" y="3954542"/>
             <a:ext cx="360000" cy="360000"/>
           </a:xfrm>
           <a:prstGeom prst="ellipse">
@@ -6294,60 +6279,21 @@
           </a:p>
         </p:txBody>
       </p:sp>
-      <p:cxnSp>
-        <p:nvCxnSpPr>
-          <p:cNvPr id="30" name="Gerader Verbinder 29">
-            <a:extLst>
-              <a:ext uri="{FF2B5EF4-FFF2-40B4-BE49-F238E27FC236}">
-                <a16:creationId xmlns:a16="http://schemas.microsoft.com/office/drawing/2014/main" id="{F76142DB-BC9D-4FC9-A1EC-D07725483C05}"/>
-              </a:ext>
-            </a:extLst>
-          </p:cNvPr>
-          <p:cNvCxnSpPr>
-            <a:cxnSpLocks/>
-          </p:cNvCxnSpPr>
-          <p:nvPr/>
-        </p:nvCxnSpPr>
-        <p:spPr>
-          <a:xfrm>
-            <a:off x="2774564" y="0"/>
-            <a:ext cx="0" cy="6924486"/>
-          </a:xfrm>
-          <a:prstGeom prst="line">
-            <a:avLst/>
-          </a:prstGeom>
-          <a:ln w="76200"/>
-        </p:spPr>
-        <p:style>
-          <a:lnRef idx="3">
-            <a:schemeClr val="accent3"/>
-          </a:lnRef>
-          <a:fillRef idx="0">
-            <a:schemeClr val="accent3"/>
-          </a:fillRef>
-          <a:effectRef idx="2">
-            <a:schemeClr val="accent3"/>
-          </a:effectRef>
-          <a:fontRef idx="minor">
-            <a:schemeClr val="tx1"/>
-          </a:fontRef>
-        </p:style>
-      </p:cxnSp>
-      <p:sp>
-        <p:nvSpPr>
-          <p:cNvPr id="53" name="Ellipse 52">
-            <a:extLst>
-              <a:ext uri="{FF2B5EF4-FFF2-40B4-BE49-F238E27FC236}">
-                <a16:creationId xmlns:a16="http://schemas.microsoft.com/office/drawing/2014/main" id="{59E707F2-24D4-4903-90C6-849F03103749}"/>
-              </a:ext>
-            </a:extLst>
-          </p:cNvPr>
-          <p:cNvSpPr/>
-          <p:nvPr/>
-        </p:nvSpPr>
-        <p:spPr>
-          <a:xfrm>
-            <a:off x="4218724" y="3954542"/>
+      <p:sp>
+        <p:nvSpPr>
+          <p:cNvPr id="54" name="Ellipse 53">
+            <a:extLst>
+              <a:ext uri="{FF2B5EF4-FFF2-40B4-BE49-F238E27FC236}">
+                <a16:creationId xmlns:a16="http://schemas.microsoft.com/office/drawing/2014/main" id="{C01C54E8-9F52-4C23-8BF9-C3B91665912C}"/>
+              </a:ext>
+            </a:extLst>
+          </p:cNvPr>
+          <p:cNvSpPr/>
+          <p:nvPr/>
+        </p:nvSpPr>
+        <p:spPr>
+          <a:xfrm>
+            <a:off x="3869703" y="4939810"/>
             <a:ext cx="360000" cy="360000"/>
           </a:xfrm>
           <a:prstGeom prst="ellipse">
@@ -6383,25 +6329,25 @@
           <a:lstStyle/>
           <a:p>
             <a:pPr algn="ctr"/>
-            <a:endParaRPr lang="de-DE"/>
-          </a:p>
-        </p:txBody>
-      </p:sp>
-      <p:sp>
-        <p:nvSpPr>
-          <p:cNvPr id="54" name="Ellipse 53">
-            <a:extLst>
-              <a:ext uri="{FF2B5EF4-FFF2-40B4-BE49-F238E27FC236}">
-                <a16:creationId xmlns:a16="http://schemas.microsoft.com/office/drawing/2014/main" id="{C01C54E8-9F52-4C23-8BF9-C3B91665912C}"/>
-              </a:ext>
-            </a:extLst>
-          </p:cNvPr>
-          <p:cNvSpPr/>
-          <p:nvPr/>
-        </p:nvSpPr>
-        <p:spPr>
-          <a:xfrm>
-            <a:off x="3869703" y="4939810"/>
+            <a:endParaRPr lang="de-DE" dirty="0"/>
+          </a:p>
+        </p:txBody>
+      </p:sp>
+      <p:sp>
+        <p:nvSpPr>
+          <p:cNvPr id="55" name="Ellipse 54">
+            <a:extLst>
+              <a:ext uri="{FF2B5EF4-FFF2-40B4-BE49-F238E27FC236}">
+                <a16:creationId xmlns:a16="http://schemas.microsoft.com/office/drawing/2014/main" id="{9E13DE1E-ED3A-44C6-AE72-C4EAB14B0079}"/>
+              </a:ext>
+            </a:extLst>
+          </p:cNvPr>
+          <p:cNvSpPr/>
+          <p:nvPr/>
+        </p:nvSpPr>
+        <p:spPr>
+          <a:xfrm>
+            <a:off x="3901166" y="2243279"/>
             <a:ext cx="360000" cy="360000"/>
           </a:xfrm>
           <a:prstGeom prst="ellipse">
@@ -6437,25 +6383,77 @@
           <a:lstStyle/>
           <a:p>
             <a:pPr algn="ctr"/>
-            <a:endParaRPr lang="de-DE" dirty="0"/>
-          </a:p>
-        </p:txBody>
-      </p:sp>
-      <p:sp>
-        <p:nvSpPr>
-          <p:cNvPr id="55" name="Ellipse 54">
-            <a:extLst>
-              <a:ext uri="{FF2B5EF4-FFF2-40B4-BE49-F238E27FC236}">
-                <a16:creationId xmlns:a16="http://schemas.microsoft.com/office/drawing/2014/main" id="{9E13DE1E-ED3A-44C6-AE72-C4EAB14B0079}"/>
-              </a:ext>
-            </a:extLst>
-          </p:cNvPr>
-          <p:cNvSpPr/>
-          <p:nvPr/>
-        </p:nvSpPr>
-        <p:spPr>
-          <a:xfrm>
-            <a:off x="3901166" y="2243279"/>
+            <a:endParaRPr lang="de-DE"/>
+          </a:p>
+        </p:txBody>
+      </p:sp>
+      <p:sp>
+        <p:nvSpPr>
+          <p:cNvPr id="58" name="Rechteck 57">
+            <a:extLst>
+              <a:ext uri="{FF2B5EF4-FFF2-40B4-BE49-F238E27FC236}">
+                <a16:creationId xmlns:a16="http://schemas.microsoft.com/office/drawing/2014/main" id="{16D3FA83-624B-433C-AB9D-6A154AF73A5B}"/>
+              </a:ext>
+            </a:extLst>
+          </p:cNvPr>
+          <p:cNvSpPr/>
+          <p:nvPr/>
+        </p:nvSpPr>
+        <p:spPr>
+          <a:xfrm>
+            <a:off x="2865001" y="2180322"/>
+            <a:ext cx="480476" cy="543246"/>
+          </a:xfrm>
+          <a:prstGeom prst="rect">
+            <a:avLst/>
+          </a:prstGeom>
+          <a:solidFill>
+            <a:schemeClr val="accent3">
+              <a:alpha val="50000"/>
+            </a:schemeClr>
+          </a:solidFill>
+          <a:ln>
+            <a:noFill/>
+          </a:ln>
+        </p:spPr>
+        <p:style>
+          <a:lnRef idx="0">
+            <a:scrgbClr r="0" g="0" b="0"/>
+          </a:lnRef>
+          <a:fillRef idx="0">
+            <a:scrgbClr r="0" g="0" b="0"/>
+          </a:fillRef>
+          <a:effectRef idx="0">
+            <a:scrgbClr r="0" g="0" b="0"/>
+          </a:effectRef>
+          <a:fontRef idx="minor">
+            <a:schemeClr val="lt1"/>
+          </a:fontRef>
+        </p:style>
+        <p:txBody>
+          <a:bodyPr rtlCol="0" anchor="ctr"/>
+          <a:lstStyle/>
+          <a:p>
+            <a:pPr algn="ctr"/>
+            <a:endParaRPr lang="de-DE"/>
+          </a:p>
+        </p:txBody>
+      </p:sp>
+      <p:sp>
+        <p:nvSpPr>
+          <p:cNvPr id="63" name="Ellipse 62">
+            <a:extLst>
+              <a:ext uri="{FF2B5EF4-FFF2-40B4-BE49-F238E27FC236}">
+                <a16:creationId xmlns:a16="http://schemas.microsoft.com/office/drawing/2014/main" id="{150754FB-D848-471B-8D96-F69D12BC0B5F}"/>
+              </a:ext>
+            </a:extLst>
+          </p:cNvPr>
+          <p:cNvSpPr/>
+          <p:nvPr/>
+        </p:nvSpPr>
+        <p:spPr>
+          <a:xfrm>
+            <a:off x="2919643" y="2241931"/>
             <a:ext cx="360000" cy="360000"/>
           </a:xfrm>
           <a:prstGeom prst="ellipse">
@@ -6497,71 +6495,19 @@
       </p:sp>
       <p:sp>
         <p:nvSpPr>
-          <p:cNvPr id="58" name="Rechteck 57">
-            <a:extLst>
-              <a:ext uri="{FF2B5EF4-FFF2-40B4-BE49-F238E27FC236}">
-                <a16:creationId xmlns:a16="http://schemas.microsoft.com/office/drawing/2014/main" id="{16D3FA83-624B-433C-AB9D-6A154AF73A5B}"/>
-              </a:ext>
-            </a:extLst>
-          </p:cNvPr>
-          <p:cNvSpPr/>
-          <p:nvPr/>
-        </p:nvSpPr>
-        <p:spPr>
-          <a:xfrm>
-            <a:off x="2865001" y="2180322"/>
-            <a:ext cx="480476" cy="543246"/>
-          </a:xfrm>
-          <a:prstGeom prst="rect">
-            <a:avLst/>
-          </a:prstGeom>
-          <a:solidFill>
-            <a:schemeClr val="accent3">
-              <a:alpha val="50000"/>
-            </a:schemeClr>
-          </a:solidFill>
-          <a:ln>
-            <a:noFill/>
-          </a:ln>
-        </p:spPr>
-        <p:style>
-          <a:lnRef idx="0">
-            <a:scrgbClr r="0" g="0" b="0"/>
-          </a:lnRef>
-          <a:fillRef idx="0">
-            <a:scrgbClr r="0" g="0" b="0"/>
-          </a:fillRef>
-          <a:effectRef idx="0">
-            <a:scrgbClr r="0" g="0" b="0"/>
-          </a:effectRef>
-          <a:fontRef idx="minor">
-            <a:schemeClr val="lt1"/>
-          </a:fontRef>
-        </p:style>
-        <p:txBody>
-          <a:bodyPr rtlCol="0" anchor="ctr"/>
-          <a:lstStyle/>
-          <a:p>
-            <a:pPr algn="ctr"/>
-            <a:endParaRPr lang="de-DE"/>
-          </a:p>
-        </p:txBody>
-      </p:sp>
-      <p:sp>
-        <p:nvSpPr>
-          <p:cNvPr id="63" name="Ellipse 62">
-            <a:extLst>
-              <a:ext uri="{FF2B5EF4-FFF2-40B4-BE49-F238E27FC236}">
-                <a16:creationId xmlns:a16="http://schemas.microsoft.com/office/drawing/2014/main" id="{150754FB-D848-471B-8D96-F69D12BC0B5F}"/>
-              </a:ext>
-            </a:extLst>
-          </p:cNvPr>
-          <p:cNvSpPr/>
-          <p:nvPr/>
-        </p:nvSpPr>
-        <p:spPr>
-          <a:xfrm>
-            <a:off x="2919643" y="2241931"/>
+          <p:cNvPr id="64" name="Ellipse 63">
+            <a:extLst>
+              <a:ext uri="{FF2B5EF4-FFF2-40B4-BE49-F238E27FC236}">
+                <a16:creationId xmlns:a16="http://schemas.microsoft.com/office/drawing/2014/main" id="{616ACED9-330A-46A2-BF9C-5742F3E18A24}"/>
+              </a:ext>
+            </a:extLst>
+          </p:cNvPr>
+          <p:cNvSpPr/>
+          <p:nvPr/>
+        </p:nvSpPr>
+        <p:spPr>
+          <a:xfrm>
+            <a:off x="3379656" y="4316488"/>
             <a:ext cx="360000" cy="360000"/>
           </a:xfrm>
           <a:prstGeom prst="ellipse">
@@ -6603,19 +6549,747 @@
       </p:sp>
       <p:sp>
         <p:nvSpPr>
-          <p:cNvPr id="64" name="Ellipse 63">
-            <a:extLst>
-              <a:ext uri="{FF2B5EF4-FFF2-40B4-BE49-F238E27FC236}">
-                <a16:creationId xmlns:a16="http://schemas.microsoft.com/office/drawing/2014/main" id="{616ACED9-330A-46A2-BF9C-5742F3E18A24}"/>
-              </a:ext>
-            </a:extLst>
-          </p:cNvPr>
-          <p:cNvSpPr/>
-          <p:nvPr/>
-        </p:nvSpPr>
-        <p:spPr>
-          <a:xfrm>
-            <a:off x="3379656" y="4316488"/>
+          <p:cNvPr id="66" name="Rechteck 65">
+            <a:extLst>
+              <a:ext uri="{FF2B5EF4-FFF2-40B4-BE49-F238E27FC236}">
+                <a16:creationId xmlns:a16="http://schemas.microsoft.com/office/drawing/2014/main" id="{37410B60-5CEF-4808-8CED-791A7083AD9B}"/>
+              </a:ext>
+            </a:extLst>
+          </p:cNvPr>
+          <p:cNvSpPr/>
+          <p:nvPr/>
+        </p:nvSpPr>
+        <p:spPr>
+          <a:xfrm>
+            <a:off x="4351908" y="2156189"/>
+            <a:ext cx="480476" cy="543246"/>
+          </a:xfrm>
+          <a:prstGeom prst="rect">
+            <a:avLst/>
+          </a:prstGeom>
+          <a:solidFill>
+            <a:schemeClr val="accent3">
+              <a:alpha val="50000"/>
+            </a:schemeClr>
+          </a:solidFill>
+          <a:ln>
+            <a:noFill/>
+          </a:ln>
+        </p:spPr>
+        <p:style>
+          <a:lnRef idx="0">
+            <a:scrgbClr r="0" g="0" b="0"/>
+          </a:lnRef>
+          <a:fillRef idx="0">
+            <a:scrgbClr r="0" g="0" b="0"/>
+          </a:fillRef>
+          <a:effectRef idx="0">
+            <a:scrgbClr r="0" g="0" b="0"/>
+          </a:effectRef>
+          <a:fontRef idx="minor">
+            <a:schemeClr val="lt1"/>
+          </a:fontRef>
+        </p:style>
+        <p:txBody>
+          <a:bodyPr rtlCol="0" anchor="ctr"/>
+          <a:lstStyle/>
+          <a:p>
+            <a:pPr algn="ctr"/>
+            <a:endParaRPr lang="de-DE"/>
+          </a:p>
+        </p:txBody>
+      </p:sp>
+      <p:sp>
+        <p:nvSpPr>
+          <p:cNvPr id="67" name="Rechteck 66">
+            <a:extLst>
+              <a:ext uri="{FF2B5EF4-FFF2-40B4-BE49-F238E27FC236}">
+                <a16:creationId xmlns:a16="http://schemas.microsoft.com/office/drawing/2014/main" id="{5690F12A-E515-47EA-AD89-3C0749138ACF}"/>
+              </a:ext>
+            </a:extLst>
+          </p:cNvPr>
+          <p:cNvSpPr/>
+          <p:nvPr/>
+        </p:nvSpPr>
+        <p:spPr>
+          <a:xfrm>
+            <a:off x="4829249" y="2156189"/>
+            <a:ext cx="480476" cy="543246"/>
+          </a:xfrm>
+          <a:prstGeom prst="rect">
+            <a:avLst/>
+          </a:prstGeom>
+          <a:solidFill>
+            <a:schemeClr val="accent3">
+              <a:alpha val="50000"/>
+            </a:schemeClr>
+          </a:solidFill>
+          <a:ln>
+            <a:noFill/>
+          </a:ln>
+        </p:spPr>
+        <p:style>
+          <a:lnRef idx="0">
+            <a:scrgbClr r="0" g="0" b="0"/>
+          </a:lnRef>
+          <a:fillRef idx="0">
+            <a:scrgbClr r="0" g="0" b="0"/>
+          </a:fillRef>
+          <a:effectRef idx="0">
+            <a:scrgbClr r="0" g="0" b="0"/>
+          </a:effectRef>
+          <a:fontRef idx="minor">
+            <a:schemeClr val="lt1"/>
+          </a:fontRef>
+        </p:style>
+        <p:txBody>
+          <a:bodyPr rtlCol="0" anchor="ctr"/>
+          <a:lstStyle/>
+          <a:p>
+            <a:pPr algn="ctr"/>
+            <a:endParaRPr lang="de-DE"/>
+          </a:p>
+        </p:txBody>
+      </p:sp>
+      <p:sp>
+        <p:nvSpPr>
+          <p:cNvPr id="68" name="Rechteck 67">
+            <a:extLst>
+              <a:ext uri="{FF2B5EF4-FFF2-40B4-BE49-F238E27FC236}">
+                <a16:creationId xmlns:a16="http://schemas.microsoft.com/office/drawing/2014/main" id="{BBD157D9-A8D8-4800-A372-01326B82900C}"/>
+              </a:ext>
+            </a:extLst>
+          </p:cNvPr>
+          <p:cNvSpPr/>
+          <p:nvPr/>
+        </p:nvSpPr>
+        <p:spPr>
+          <a:xfrm>
+            <a:off x="3333107" y="1253292"/>
+            <a:ext cx="480476" cy="543246"/>
+          </a:xfrm>
+          <a:prstGeom prst="rect">
+            <a:avLst/>
+          </a:prstGeom>
+          <a:solidFill>
+            <a:schemeClr val="accent3">
+              <a:alpha val="50000"/>
+            </a:schemeClr>
+          </a:solidFill>
+          <a:ln>
+            <a:noFill/>
+          </a:ln>
+        </p:spPr>
+        <p:style>
+          <a:lnRef idx="0">
+            <a:scrgbClr r="0" g="0" b="0"/>
+          </a:lnRef>
+          <a:fillRef idx="0">
+            <a:scrgbClr r="0" g="0" b="0"/>
+          </a:fillRef>
+          <a:effectRef idx="0">
+            <a:scrgbClr r="0" g="0" b="0"/>
+          </a:effectRef>
+          <a:fontRef idx="minor">
+            <a:schemeClr val="lt1"/>
+          </a:fontRef>
+        </p:style>
+        <p:txBody>
+          <a:bodyPr rtlCol="0" anchor="ctr"/>
+          <a:lstStyle/>
+          <a:p>
+            <a:pPr algn="ctr"/>
+            <a:endParaRPr lang="de-DE"/>
+          </a:p>
+        </p:txBody>
+      </p:sp>
+      <p:sp>
+        <p:nvSpPr>
+          <p:cNvPr id="69" name="Rechteck 68">
+            <a:extLst>
+              <a:ext uri="{FF2B5EF4-FFF2-40B4-BE49-F238E27FC236}">
+                <a16:creationId xmlns:a16="http://schemas.microsoft.com/office/drawing/2014/main" id="{97FE14A6-34B8-46E0-B77B-DE342DB2CD3B}"/>
+              </a:ext>
+            </a:extLst>
+          </p:cNvPr>
+          <p:cNvSpPr/>
+          <p:nvPr/>
+        </p:nvSpPr>
+        <p:spPr>
+          <a:xfrm>
+            <a:off x="2859405" y="1253292"/>
+            <a:ext cx="480476" cy="543246"/>
+          </a:xfrm>
+          <a:prstGeom prst="rect">
+            <a:avLst/>
+          </a:prstGeom>
+          <a:solidFill>
+            <a:schemeClr val="accent3">
+              <a:alpha val="50000"/>
+            </a:schemeClr>
+          </a:solidFill>
+          <a:ln>
+            <a:noFill/>
+          </a:ln>
+        </p:spPr>
+        <p:style>
+          <a:lnRef idx="0">
+            <a:scrgbClr r="0" g="0" b="0"/>
+          </a:lnRef>
+          <a:fillRef idx="0">
+            <a:scrgbClr r="0" g="0" b="0"/>
+          </a:fillRef>
+          <a:effectRef idx="0">
+            <a:scrgbClr r="0" g="0" b="0"/>
+          </a:effectRef>
+          <a:fontRef idx="minor">
+            <a:schemeClr val="lt1"/>
+          </a:fontRef>
+        </p:style>
+        <p:txBody>
+          <a:bodyPr rtlCol="0" anchor="ctr"/>
+          <a:lstStyle/>
+          <a:p>
+            <a:pPr algn="ctr"/>
+            <a:endParaRPr lang="de-DE"/>
+          </a:p>
+        </p:txBody>
+      </p:sp>
+      <p:sp>
+        <p:nvSpPr>
+          <p:cNvPr id="70" name="Rechteck 69">
+            <a:extLst>
+              <a:ext uri="{FF2B5EF4-FFF2-40B4-BE49-F238E27FC236}">
+                <a16:creationId xmlns:a16="http://schemas.microsoft.com/office/drawing/2014/main" id="{82DE4455-49CE-4E3E-A549-B2A122162DF3}"/>
+              </a:ext>
+            </a:extLst>
+          </p:cNvPr>
+          <p:cNvSpPr/>
+          <p:nvPr/>
+        </p:nvSpPr>
+        <p:spPr>
+          <a:xfrm>
+            <a:off x="4829249" y="1252943"/>
+            <a:ext cx="480476" cy="543246"/>
+          </a:xfrm>
+          <a:prstGeom prst="rect">
+            <a:avLst/>
+          </a:prstGeom>
+          <a:solidFill>
+            <a:schemeClr val="accent3">
+              <a:alpha val="50000"/>
+            </a:schemeClr>
+          </a:solidFill>
+          <a:ln>
+            <a:noFill/>
+          </a:ln>
+        </p:spPr>
+        <p:style>
+          <a:lnRef idx="0">
+            <a:scrgbClr r="0" g="0" b="0"/>
+          </a:lnRef>
+          <a:fillRef idx="0">
+            <a:scrgbClr r="0" g="0" b="0"/>
+          </a:fillRef>
+          <a:effectRef idx="0">
+            <a:scrgbClr r="0" g="0" b="0"/>
+          </a:effectRef>
+          <a:fontRef idx="minor">
+            <a:schemeClr val="lt1"/>
+          </a:fontRef>
+        </p:style>
+        <p:txBody>
+          <a:bodyPr rtlCol="0" anchor="ctr"/>
+          <a:lstStyle/>
+          <a:p>
+            <a:pPr algn="ctr"/>
+            <a:endParaRPr lang="de-DE"/>
+          </a:p>
+        </p:txBody>
+      </p:sp>
+      <p:sp>
+        <p:nvSpPr>
+          <p:cNvPr id="71" name="Rechteck 70">
+            <a:extLst>
+              <a:ext uri="{FF2B5EF4-FFF2-40B4-BE49-F238E27FC236}">
+                <a16:creationId xmlns:a16="http://schemas.microsoft.com/office/drawing/2014/main" id="{DC6A3319-6D79-4CD3-AE83-E8AE8BDAFE5C}"/>
+              </a:ext>
+            </a:extLst>
+          </p:cNvPr>
+          <p:cNvSpPr/>
+          <p:nvPr/>
+        </p:nvSpPr>
+        <p:spPr>
+          <a:xfrm>
+            <a:off x="4351894" y="1253292"/>
+            <a:ext cx="480476" cy="543246"/>
+          </a:xfrm>
+          <a:prstGeom prst="rect">
+            <a:avLst/>
+          </a:prstGeom>
+          <a:solidFill>
+            <a:schemeClr val="accent3">
+              <a:alpha val="50000"/>
+            </a:schemeClr>
+          </a:solidFill>
+          <a:ln>
+            <a:noFill/>
+          </a:ln>
+        </p:spPr>
+        <p:style>
+          <a:lnRef idx="0">
+            <a:scrgbClr r="0" g="0" b="0"/>
+          </a:lnRef>
+          <a:fillRef idx="0">
+            <a:scrgbClr r="0" g="0" b="0"/>
+          </a:fillRef>
+          <a:effectRef idx="0">
+            <a:scrgbClr r="0" g="0" b="0"/>
+          </a:effectRef>
+          <a:fontRef idx="minor">
+            <a:schemeClr val="lt1"/>
+          </a:fontRef>
+        </p:style>
+        <p:txBody>
+          <a:bodyPr rtlCol="0" anchor="ctr"/>
+          <a:lstStyle/>
+          <a:p>
+            <a:pPr algn="ctr"/>
+            <a:endParaRPr lang="de-DE"/>
+          </a:p>
+        </p:txBody>
+      </p:sp>
+      <p:sp>
+        <p:nvSpPr>
+          <p:cNvPr id="72" name="Rechteck 71">
+            <a:extLst>
+              <a:ext uri="{FF2B5EF4-FFF2-40B4-BE49-F238E27FC236}">
+                <a16:creationId xmlns:a16="http://schemas.microsoft.com/office/drawing/2014/main" id="{50B1BE59-B97F-4D38-9C8E-28007D923601}"/>
+              </a:ext>
+            </a:extLst>
+          </p:cNvPr>
+          <p:cNvSpPr/>
+          <p:nvPr/>
+        </p:nvSpPr>
+        <p:spPr>
+          <a:xfrm>
+            <a:off x="3331755" y="642660"/>
+            <a:ext cx="480476" cy="543246"/>
+          </a:xfrm>
+          <a:prstGeom prst="rect">
+            <a:avLst/>
+          </a:prstGeom>
+          <a:solidFill>
+            <a:schemeClr val="accent3">
+              <a:alpha val="50000"/>
+            </a:schemeClr>
+          </a:solidFill>
+          <a:ln>
+            <a:noFill/>
+          </a:ln>
+        </p:spPr>
+        <p:style>
+          <a:lnRef idx="0">
+            <a:scrgbClr r="0" g="0" b="0"/>
+          </a:lnRef>
+          <a:fillRef idx="0">
+            <a:scrgbClr r="0" g="0" b="0"/>
+          </a:fillRef>
+          <a:effectRef idx="0">
+            <a:scrgbClr r="0" g="0" b="0"/>
+          </a:effectRef>
+          <a:fontRef idx="minor">
+            <a:schemeClr val="lt1"/>
+          </a:fontRef>
+        </p:style>
+        <p:txBody>
+          <a:bodyPr rtlCol="0" anchor="ctr"/>
+          <a:lstStyle/>
+          <a:p>
+            <a:pPr algn="ctr"/>
+            <a:endParaRPr lang="de-DE"/>
+          </a:p>
+        </p:txBody>
+      </p:sp>
+      <p:sp>
+        <p:nvSpPr>
+          <p:cNvPr id="73" name="Rechteck 72">
+            <a:extLst>
+              <a:ext uri="{FF2B5EF4-FFF2-40B4-BE49-F238E27FC236}">
+                <a16:creationId xmlns:a16="http://schemas.microsoft.com/office/drawing/2014/main" id="{43669A33-30E3-4B3E-91EC-FE5122ECC7F9}"/>
+              </a:ext>
+            </a:extLst>
+          </p:cNvPr>
+          <p:cNvSpPr/>
+          <p:nvPr/>
+        </p:nvSpPr>
+        <p:spPr>
+          <a:xfrm>
+            <a:off x="2859405" y="642375"/>
+            <a:ext cx="480476" cy="543246"/>
+          </a:xfrm>
+          <a:prstGeom prst="rect">
+            <a:avLst/>
+          </a:prstGeom>
+          <a:solidFill>
+            <a:schemeClr val="accent3">
+              <a:alpha val="50000"/>
+            </a:schemeClr>
+          </a:solidFill>
+          <a:ln>
+            <a:noFill/>
+          </a:ln>
+        </p:spPr>
+        <p:style>
+          <a:lnRef idx="0">
+            <a:scrgbClr r="0" g="0" b="0"/>
+          </a:lnRef>
+          <a:fillRef idx="0">
+            <a:scrgbClr r="0" g="0" b="0"/>
+          </a:fillRef>
+          <a:effectRef idx="0">
+            <a:scrgbClr r="0" g="0" b="0"/>
+          </a:effectRef>
+          <a:fontRef idx="minor">
+            <a:schemeClr val="lt1"/>
+          </a:fontRef>
+        </p:style>
+        <p:txBody>
+          <a:bodyPr rtlCol="0" anchor="ctr"/>
+          <a:lstStyle/>
+          <a:p>
+            <a:pPr algn="ctr"/>
+            <a:endParaRPr lang="de-DE"/>
+          </a:p>
+        </p:txBody>
+      </p:sp>
+      <p:sp>
+        <p:nvSpPr>
+          <p:cNvPr id="74" name="Rechteck 73">
+            <a:extLst>
+              <a:ext uri="{FF2B5EF4-FFF2-40B4-BE49-F238E27FC236}">
+                <a16:creationId xmlns:a16="http://schemas.microsoft.com/office/drawing/2014/main" id="{54531EF2-DE05-4678-9756-EF56416A0736}"/>
+              </a:ext>
+            </a:extLst>
+          </p:cNvPr>
+          <p:cNvSpPr/>
+          <p:nvPr/>
+        </p:nvSpPr>
+        <p:spPr>
+          <a:xfrm>
+            <a:off x="4346533" y="642375"/>
+            <a:ext cx="492538" cy="543246"/>
+          </a:xfrm>
+          <a:prstGeom prst="rect">
+            <a:avLst/>
+          </a:prstGeom>
+          <a:solidFill>
+            <a:schemeClr val="accent3">
+              <a:alpha val="50000"/>
+            </a:schemeClr>
+          </a:solidFill>
+          <a:ln>
+            <a:noFill/>
+          </a:ln>
+        </p:spPr>
+        <p:style>
+          <a:lnRef idx="0">
+            <a:scrgbClr r="0" g="0" b="0"/>
+          </a:lnRef>
+          <a:fillRef idx="0">
+            <a:scrgbClr r="0" g="0" b="0"/>
+          </a:fillRef>
+          <a:effectRef idx="0">
+            <a:scrgbClr r="0" g="0" b="0"/>
+          </a:effectRef>
+          <a:fontRef idx="minor">
+            <a:schemeClr val="lt1"/>
+          </a:fontRef>
+        </p:style>
+        <p:txBody>
+          <a:bodyPr rtlCol="0" anchor="ctr"/>
+          <a:lstStyle/>
+          <a:p>
+            <a:pPr algn="ctr"/>
+            <a:endParaRPr lang="de-DE"/>
+          </a:p>
+        </p:txBody>
+      </p:sp>
+      <p:sp>
+        <p:nvSpPr>
+          <p:cNvPr id="75" name="Rechteck 74">
+            <a:extLst>
+              <a:ext uri="{FF2B5EF4-FFF2-40B4-BE49-F238E27FC236}">
+                <a16:creationId xmlns:a16="http://schemas.microsoft.com/office/drawing/2014/main" id="{A36BEEF2-B6E2-46AF-85CD-3229A0E435D0}"/>
+              </a:ext>
+            </a:extLst>
+          </p:cNvPr>
+          <p:cNvSpPr/>
+          <p:nvPr/>
+        </p:nvSpPr>
+        <p:spPr>
+          <a:xfrm>
+            <a:off x="4827009" y="642375"/>
+            <a:ext cx="480476" cy="543246"/>
+          </a:xfrm>
+          <a:prstGeom prst="rect">
+            <a:avLst/>
+          </a:prstGeom>
+          <a:solidFill>
+            <a:schemeClr val="accent3">
+              <a:alpha val="50000"/>
+            </a:schemeClr>
+          </a:solidFill>
+          <a:ln>
+            <a:noFill/>
+          </a:ln>
+        </p:spPr>
+        <p:style>
+          <a:lnRef idx="0">
+            <a:scrgbClr r="0" g="0" b="0"/>
+          </a:lnRef>
+          <a:fillRef idx="0">
+            <a:scrgbClr r="0" g="0" b="0"/>
+          </a:fillRef>
+          <a:effectRef idx="0">
+            <a:scrgbClr r="0" g="0" b="0"/>
+          </a:effectRef>
+          <a:fontRef idx="minor">
+            <a:schemeClr val="lt1"/>
+          </a:fontRef>
+        </p:style>
+        <p:txBody>
+          <a:bodyPr rtlCol="0" anchor="ctr"/>
+          <a:lstStyle/>
+          <a:p>
+            <a:pPr algn="ctr"/>
+            <a:endParaRPr lang="de-DE"/>
+          </a:p>
+        </p:txBody>
+      </p:sp>
+      <p:sp>
+        <p:nvSpPr>
+          <p:cNvPr id="76" name="Rechteck 75">
+            <a:extLst>
+              <a:ext uri="{FF2B5EF4-FFF2-40B4-BE49-F238E27FC236}">
+                <a16:creationId xmlns:a16="http://schemas.microsoft.com/office/drawing/2014/main" id="{8A14F68F-F1AD-4A1F-9EE4-63F9562BC08B}"/>
+              </a:ext>
+            </a:extLst>
+          </p:cNvPr>
+          <p:cNvSpPr/>
+          <p:nvPr/>
+        </p:nvSpPr>
+        <p:spPr>
+          <a:xfrm>
+            <a:off x="3347289" y="-284655"/>
+            <a:ext cx="480476" cy="543246"/>
+          </a:xfrm>
+          <a:prstGeom prst="rect">
+            <a:avLst/>
+          </a:prstGeom>
+          <a:solidFill>
+            <a:schemeClr val="accent3">
+              <a:alpha val="50000"/>
+            </a:schemeClr>
+          </a:solidFill>
+          <a:ln>
+            <a:noFill/>
+          </a:ln>
+        </p:spPr>
+        <p:style>
+          <a:lnRef idx="0">
+            <a:scrgbClr r="0" g="0" b="0"/>
+          </a:lnRef>
+          <a:fillRef idx="0">
+            <a:scrgbClr r="0" g="0" b="0"/>
+          </a:fillRef>
+          <a:effectRef idx="0">
+            <a:scrgbClr r="0" g="0" b="0"/>
+          </a:effectRef>
+          <a:fontRef idx="minor">
+            <a:schemeClr val="lt1"/>
+          </a:fontRef>
+        </p:style>
+        <p:txBody>
+          <a:bodyPr rtlCol="0" anchor="ctr"/>
+          <a:lstStyle/>
+          <a:p>
+            <a:pPr algn="ctr"/>
+            <a:endParaRPr lang="de-DE"/>
+          </a:p>
+        </p:txBody>
+      </p:sp>
+      <p:sp>
+        <p:nvSpPr>
+          <p:cNvPr id="77" name="Rechteck 76">
+            <a:extLst>
+              <a:ext uri="{FF2B5EF4-FFF2-40B4-BE49-F238E27FC236}">
+                <a16:creationId xmlns:a16="http://schemas.microsoft.com/office/drawing/2014/main" id="{21044944-8372-4D1A-B794-DDD4FB42D13B}"/>
+              </a:ext>
+            </a:extLst>
+          </p:cNvPr>
+          <p:cNvSpPr/>
+          <p:nvPr/>
+        </p:nvSpPr>
+        <p:spPr>
+          <a:xfrm>
+            <a:off x="2867299" y="-284655"/>
+            <a:ext cx="480476" cy="543246"/>
+          </a:xfrm>
+          <a:prstGeom prst="rect">
+            <a:avLst/>
+          </a:prstGeom>
+          <a:solidFill>
+            <a:schemeClr val="accent3">
+              <a:alpha val="50000"/>
+            </a:schemeClr>
+          </a:solidFill>
+          <a:ln>
+            <a:noFill/>
+          </a:ln>
+        </p:spPr>
+        <p:style>
+          <a:lnRef idx="0">
+            <a:scrgbClr r="0" g="0" b="0"/>
+          </a:lnRef>
+          <a:fillRef idx="0">
+            <a:scrgbClr r="0" g="0" b="0"/>
+          </a:fillRef>
+          <a:effectRef idx="0">
+            <a:scrgbClr r="0" g="0" b="0"/>
+          </a:effectRef>
+          <a:fontRef idx="minor">
+            <a:schemeClr val="lt1"/>
+          </a:fontRef>
+        </p:style>
+        <p:txBody>
+          <a:bodyPr rtlCol="0" anchor="ctr"/>
+          <a:lstStyle/>
+          <a:p>
+            <a:pPr algn="ctr"/>
+            <a:endParaRPr lang="de-DE"/>
+          </a:p>
+        </p:txBody>
+      </p:sp>
+      <p:sp>
+        <p:nvSpPr>
+          <p:cNvPr id="78" name="Rechteck 77">
+            <a:extLst>
+              <a:ext uri="{FF2B5EF4-FFF2-40B4-BE49-F238E27FC236}">
+                <a16:creationId xmlns:a16="http://schemas.microsoft.com/office/drawing/2014/main" id="{66527E0B-9EE1-475A-A65E-BE709237601B}"/>
+              </a:ext>
+            </a:extLst>
+          </p:cNvPr>
+          <p:cNvSpPr/>
+          <p:nvPr/>
+        </p:nvSpPr>
+        <p:spPr>
+          <a:xfrm>
+            <a:off x="4829604" y="-290768"/>
+            <a:ext cx="480476" cy="543246"/>
+          </a:xfrm>
+          <a:prstGeom prst="rect">
+            <a:avLst/>
+          </a:prstGeom>
+          <a:solidFill>
+            <a:schemeClr val="accent3">
+              <a:alpha val="50000"/>
+            </a:schemeClr>
+          </a:solidFill>
+          <a:ln>
+            <a:noFill/>
+          </a:ln>
+        </p:spPr>
+        <p:style>
+          <a:lnRef idx="0">
+            <a:scrgbClr r="0" g="0" b="0"/>
+          </a:lnRef>
+          <a:fillRef idx="0">
+            <a:scrgbClr r="0" g="0" b="0"/>
+          </a:fillRef>
+          <a:effectRef idx="0">
+            <a:scrgbClr r="0" g="0" b="0"/>
+          </a:effectRef>
+          <a:fontRef idx="minor">
+            <a:schemeClr val="lt1"/>
+          </a:fontRef>
+        </p:style>
+        <p:txBody>
+          <a:bodyPr rtlCol="0" anchor="ctr"/>
+          <a:lstStyle/>
+          <a:p>
+            <a:pPr algn="ctr"/>
+            <a:endParaRPr lang="de-DE"/>
+          </a:p>
+        </p:txBody>
+      </p:sp>
+      <p:sp>
+        <p:nvSpPr>
+          <p:cNvPr id="79" name="Rechteck 78">
+            <a:extLst>
+              <a:ext uri="{FF2B5EF4-FFF2-40B4-BE49-F238E27FC236}">
+                <a16:creationId xmlns:a16="http://schemas.microsoft.com/office/drawing/2014/main" id="{C6181569-E87E-4170-B454-A00A8D241484}"/>
+              </a:ext>
+            </a:extLst>
+          </p:cNvPr>
+          <p:cNvSpPr/>
+          <p:nvPr/>
+        </p:nvSpPr>
+        <p:spPr>
+          <a:xfrm>
+            <a:off x="4353488" y="-284655"/>
+            <a:ext cx="480476" cy="543246"/>
+          </a:xfrm>
+          <a:prstGeom prst="rect">
+            <a:avLst/>
+          </a:prstGeom>
+          <a:solidFill>
+            <a:schemeClr val="accent3">
+              <a:alpha val="50000"/>
+            </a:schemeClr>
+          </a:solidFill>
+          <a:ln>
+            <a:noFill/>
+          </a:ln>
+        </p:spPr>
+        <p:style>
+          <a:lnRef idx="0">
+            <a:scrgbClr r="0" g="0" b="0"/>
+          </a:lnRef>
+          <a:fillRef idx="0">
+            <a:scrgbClr r="0" g="0" b="0"/>
+          </a:fillRef>
+          <a:effectRef idx="0">
+            <a:scrgbClr r="0" g="0" b="0"/>
+          </a:effectRef>
+          <a:fontRef idx="minor">
+            <a:schemeClr val="lt1"/>
+          </a:fontRef>
+        </p:style>
+        <p:txBody>
+          <a:bodyPr rtlCol="0" anchor="ctr"/>
+          <a:lstStyle/>
+          <a:p>
+            <a:pPr algn="ctr"/>
+            <a:endParaRPr lang="de-DE"/>
+          </a:p>
+        </p:txBody>
+      </p:sp>
+      <p:sp>
+        <p:nvSpPr>
+          <p:cNvPr id="85" name="Ellipse 84">
+            <a:extLst>
+              <a:ext uri="{FF2B5EF4-FFF2-40B4-BE49-F238E27FC236}">
+                <a16:creationId xmlns:a16="http://schemas.microsoft.com/office/drawing/2014/main" id="{607EF35C-DC59-43EC-9375-A999491044A1}"/>
+              </a:ext>
+            </a:extLst>
+          </p:cNvPr>
+          <p:cNvSpPr/>
+          <p:nvPr/>
+        </p:nvSpPr>
+        <p:spPr>
+          <a:xfrm>
+            <a:off x="3498256" y="2977024"/>
             <a:ext cx="360000" cy="360000"/>
           </a:xfrm>
           <a:prstGeom prst="ellipse">
@@ -6657,747 +7331,19 @@
       </p:sp>
       <p:sp>
         <p:nvSpPr>
-          <p:cNvPr id="66" name="Rechteck 65">
-            <a:extLst>
-              <a:ext uri="{FF2B5EF4-FFF2-40B4-BE49-F238E27FC236}">
-                <a16:creationId xmlns:a16="http://schemas.microsoft.com/office/drawing/2014/main" id="{37410B60-5CEF-4808-8CED-791A7083AD9B}"/>
-              </a:ext>
-            </a:extLst>
-          </p:cNvPr>
-          <p:cNvSpPr/>
-          <p:nvPr/>
-        </p:nvSpPr>
-        <p:spPr>
-          <a:xfrm>
-            <a:off x="4351908" y="2156189"/>
-            <a:ext cx="480476" cy="543246"/>
-          </a:xfrm>
-          <a:prstGeom prst="rect">
-            <a:avLst/>
-          </a:prstGeom>
-          <a:solidFill>
-            <a:schemeClr val="accent3">
-              <a:alpha val="50000"/>
-            </a:schemeClr>
-          </a:solidFill>
-          <a:ln>
-            <a:noFill/>
-          </a:ln>
-        </p:spPr>
-        <p:style>
-          <a:lnRef idx="0">
-            <a:scrgbClr r="0" g="0" b="0"/>
-          </a:lnRef>
-          <a:fillRef idx="0">
-            <a:scrgbClr r="0" g="0" b="0"/>
-          </a:fillRef>
-          <a:effectRef idx="0">
-            <a:scrgbClr r="0" g="0" b="0"/>
-          </a:effectRef>
-          <a:fontRef idx="minor">
-            <a:schemeClr val="lt1"/>
-          </a:fontRef>
-        </p:style>
-        <p:txBody>
-          <a:bodyPr rtlCol="0" anchor="ctr"/>
-          <a:lstStyle/>
-          <a:p>
-            <a:pPr algn="ctr"/>
-            <a:endParaRPr lang="de-DE"/>
-          </a:p>
-        </p:txBody>
-      </p:sp>
-      <p:sp>
-        <p:nvSpPr>
-          <p:cNvPr id="67" name="Rechteck 66">
-            <a:extLst>
-              <a:ext uri="{FF2B5EF4-FFF2-40B4-BE49-F238E27FC236}">
-                <a16:creationId xmlns:a16="http://schemas.microsoft.com/office/drawing/2014/main" id="{5690F12A-E515-47EA-AD89-3C0749138ACF}"/>
-              </a:ext>
-            </a:extLst>
-          </p:cNvPr>
-          <p:cNvSpPr/>
-          <p:nvPr/>
-        </p:nvSpPr>
-        <p:spPr>
-          <a:xfrm>
-            <a:off x="4829249" y="2156189"/>
-            <a:ext cx="480476" cy="543246"/>
-          </a:xfrm>
-          <a:prstGeom prst="rect">
-            <a:avLst/>
-          </a:prstGeom>
-          <a:solidFill>
-            <a:schemeClr val="accent3">
-              <a:alpha val="50000"/>
-            </a:schemeClr>
-          </a:solidFill>
-          <a:ln>
-            <a:noFill/>
-          </a:ln>
-        </p:spPr>
-        <p:style>
-          <a:lnRef idx="0">
-            <a:scrgbClr r="0" g="0" b="0"/>
-          </a:lnRef>
-          <a:fillRef idx="0">
-            <a:scrgbClr r="0" g="0" b="0"/>
-          </a:fillRef>
-          <a:effectRef idx="0">
-            <a:scrgbClr r="0" g="0" b="0"/>
-          </a:effectRef>
-          <a:fontRef idx="minor">
-            <a:schemeClr val="lt1"/>
-          </a:fontRef>
-        </p:style>
-        <p:txBody>
-          <a:bodyPr rtlCol="0" anchor="ctr"/>
-          <a:lstStyle/>
-          <a:p>
-            <a:pPr algn="ctr"/>
-            <a:endParaRPr lang="de-DE"/>
-          </a:p>
-        </p:txBody>
-      </p:sp>
-      <p:sp>
-        <p:nvSpPr>
-          <p:cNvPr id="68" name="Rechteck 67">
-            <a:extLst>
-              <a:ext uri="{FF2B5EF4-FFF2-40B4-BE49-F238E27FC236}">
-                <a16:creationId xmlns:a16="http://schemas.microsoft.com/office/drawing/2014/main" id="{BBD157D9-A8D8-4800-A372-01326B82900C}"/>
-              </a:ext>
-            </a:extLst>
-          </p:cNvPr>
-          <p:cNvSpPr/>
-          <p:nvPr/>
-        </p:nvSpPr>
-        <p:spPr>
-          <a:xfrm>
-            <a:off x="3333107" y="1253292"/>
-            <a:ext cx="480476" cy="543246"/>
-          </a:xfrm>
-          <a:prstGeom prst="rect">
-            <a:avLst/>
-          </a:prstGeom>
-          <a:solidFill>
-            <a:schemeClr val="accent3">
-              <a:alpha val="50000"/>
-            </a:schemeClr>
-          </a:solidFill>
-          <a:ln>
-            <a:noFill/>
-          </a:ln>
-        </p:spPr>
-        <p:style>
-          <a:lnRef idx="0">
-            <a:scrgbClr r="0" g="0" b="0"/>
-          </a:lnRef>
-          <a:fillRef idx="0">
-            <a:scrgbClr r="0" g="0" b="0"/>
-          </a:fillRef>
-          <a:effectRef idx="0">
-            <a:scrgbClr r="0" g="0" b="0"/>
-          </a:effectRef>
-          <a:fontRef idx="minor">
-            <a:schemeClr val="lt1"/>
-          </a:fontRef>
-        </p:style>
-        <p:txBody>
-          <a:bodyPr rtlCol="0" anchor="ctr"/>
-          <a:lstStyle/>
-          <a:p>
-            <a:pPr algn="ctr"/>
-            <a:endParaRPr lang="de-DE"/>
-          </a:p>
-        </p:txBody>
-      </p:sp>
-      <p:sp>
-        <p:nvSpPr>
-          <p:cNvPr id="69" name="Rechteck 68">
-            <a:extLst>
-              <a:ext uri="{FF2B5EF4-FFF2-40B4-BE49-F238E27FC236}">
-                <a16:creationId xmlns:a16="http://schemas.microsoft.com/office/drawing/2014/main" id="{97FE14A6-34B8-46E0-B77B-DE342DB2CD3B}"/>
-              </a:ext>
-            </a:extLst>
-          </p:cNvPr>
-          <p:cNvSpPr/>
-          <p:nvPr/>
-        </p:nvSpPr>
-        <p:spPr>
-          <a:xfrm>
-            <a:off x="2859405" y="1253292"/>
-            <a:ext cx="480476" cy="543246"/>
-          </a:xfrm>
-          <a:prstGeom prst="rect">
-            <a:avLst/>
-          </a:prstGeom>
-          <a:solidFill>
-            <a:schemeClr val="accent3">
-              <a:alpha val="50000"/>
-            </a:schemeClr>
-          </a:solidFill>
-          <a:ln>
-            <a:noFill/>
-          </a:ln>
-        </p:spPr>
-        <p:style>
-          <a:lnRef idx="0">
-            <a:scrgbClr r="0" g="0" b="0"/>
-          </a:lnRef>
-          <a:fillRef idx="0">
-            <a:scrgbClr r="0" g="0" b="0"/>
-          </a:fillRef>
-          <a:effectRef idx="0">
-            <a:scrgbClr r="0" g="0" b="0"/>
-          </a:effectRef>
-          <a:fontRef idx="minor">
-            <a:schemeClr val="lt1"/>
-          </a:fontRef>
-        </p:style>
-        <p:txBody>
-          <a:bodyPr rtlCol="0" anchor="ctr"/>
-          <a:lstStyle/>
-          <a:p>
-            <a:pPr algn="ctr"/>
-            <a:endParaRPr lang="de-DE"/>
-          </a:p>
-        </p:txBody>
-      </p:sp>
-      <p:sp>
-        <p:nvSpPr>
-          <p:cNvPr id="70" name="Rechteck 69">
-            <a:extLst>
-              <a:ext uri="{FF2B5EF4-FFF2-40B4-BE49-F238E27FC236}">
-                <a16:creationId xmlns:a16="http://schemas.microsoft.com/office/drawing/2014/main" id="{82DE4455-49CE-4E3E-A549-B2A122162DF3}"/>
-              </a:ext>
-            </a:extLst>
-          </p:cNvPr>
-          <p:cNvSpPr/>
-          <p:nvPr/>
-        </p:nvSpPr>
-        <p:spPr>
-          <a:xfrm>
-            <a:off x="4829249" y="1252943"/>
-            <a:ext cx="480476" cy="543246"/>
-          </a:xfrm>
-          <a:prstGeom prst="rect">
-            <a:avLst/>
-          </a:prstGeom>
-          <a:solidFill>
-            <a:schemeClr val="accent3">
-              <a:alpha val="50000"/>
-            </a:schemeClr>
-          </a:solidFill>
-          <a:ln>
-            <a:noFill/>
-          </a:ln>
-        </p:spPr>
-        <p:style>
-          <a:lnRef idx="0">
-            <a:scrgbClr r="0" g="0" b="0"/>
-          </a:lnRef>
-          <a:fillRef idx="0">
-            <a:scrgbClr r="0" g="0" b="0"/>
-          </a:fillRef>
-          <a:effectRef idx="0">
-            <a:scrgbClr r="0" g="0" b="0"/>
-          </a:effectRef>
-          <a:fontRef idx="minor">
-            <a:schemeClr val="lt1"/>
-          </a:fontRef>
-        </p:style>
-        <p:txBody>
-          <a:bodyPr rtlCol="0" anchor="ctr"/>
-          <a:lstStyle/>
-          <a:p>
-            <a:pPr algn="ctr"/>
-            <a:endParaRPr lang="de-DE"/>
-          </a:p>
-        </p:txBody>
-      </p:sp>
-      <p:sp>
-        <p:nvSpPr>
-          <p:cNvPr id="71" name="Rechteck 70">
-            <a:extLst>
-              <a:ext uri="{FF2B5EF4-FFF2-40B4-BE49-F238E27FC236}">
-                <a16:creationId xmlns:a16="http://schemas.microsoft.com/office/drawing/2014/main" id="{DC6A3319-6D79-4CD3-AE83-E8AE8BDAFE5C}"/>
-              </a:ext>
-            </a:extLst>
-          </p:cNvPr>
-          <p:cNvSpPr/>
-          <p:nvPr/>
-        </p:nvSpPr>
-        <p:spPr>
-          <a:xfrm>
-            <a:off x="4351894" y="1253292"/>
-            <a:ext cx="480476" cy="543246"/>
-          </a:xfrm>
-          <a:prstGeom prst="rect">
-            <a:avLst/>
-          </a:prstGeom>
-          <a:solidFill>
-            <a:schemeClr val="accent3">
-              <a:alpha val="50000"/>
-            </a:schemeClr>
-          </a:solidFill>
-          <a:ln>
-            <a:noFill/>
-          </a:ln>
-        </p:spPr>
-        <p:style>
-          <a:lnRef idx="0">
-            <a:scrgbClr r="0" g="0" b="0"/>
-          </a:lnRef>
-          <a:fillRef idx="0">
-            <a:scrgbClr r="0" g="0" b="0"/>
-          </a:fillRef>
-          <a:effectRef idx="0">
-            <a:scrgbClr r="0" g="0" b="0"/>
-          </a:effectRef>
-          <a:fontRef idx="minor">
-            <a:schemeClr val="lt1"/>
-          </a:fontRef>
-        </p:style>
-        <p:txBody>
-          <a:bodyPr rtlCol="0" anchor="ctr"/>
-          <a:lstStyle/>
-          <a:p>
-            <a:pPr algn="ctr"/>
-            <a:endParaRPr lang="de-DE"/>
-          </a:p>
-        </p:txBody>
-      </p:sp>
-      <p:sp>
-        <p:nvSpPr>
-          <p:cNvPr id="72" name="Rechteck 71">
-            <a:extLst>
-              <a:ext uri="{FF2B5EF4-FFF2-40B4-BE49-F238E27FC236}">
-                <a16:creationId xmlns:a16="http://schemas.microsoft.com/office/drawing/2014/main" id="{50B1BE59-B97F-4D38-9C8E-28007D923601}"/>
-              </a:ext>
-            </a:extLst>
-          </p:cNvPr>
-          <p:cNvSpPr/>
-          <p:nvPr/>
-        </p:nvSpPr>
-        <p:spPr>
-          <a:xfrm>
-            <a:off x="3331755" y="642660"/>
-            <a:ext cx="480476" cy="543246"/>
-          </a:xfrm>
-          <a:prstGeom prst="rect">
-            <a:avLst/>
-          </a:prstGeom>
-          <a:solidFill>
-            <a:schemeClr val="accent3">
-              <a:alpha val="50000"/>
-            </a:schemeClr>
-          </a:solidFill>
-          <a:ln>
-            <a:noFill/>
-          </a:ln>
-        </p:spPr>
-        <p:style>
-          <a:lnRef idx="0">
-            <a:scrgbClr r="0" g="0" b="0"/>
-          </a:lnRef>
-          <a:fillRef idx="0">
-            <a:scrgbClr r="0" g="0" b="0"/>
-          </a:fillRef>
-          <a:effectRef idx="0">
-            <a:scrgbClr r="0" g="0" b="0"/>
-          </a:effectRef>
-          <a:fontRef idx="minor">
-            <a:schemeClr val="lt1"/>
-          </a:fontRef>
-        </p:style>
-        <p:txBody>
-          <a:bodyPr rtlCol="0" anchor="ctr"/>
-          <a:lstStyle/>
-          <a:p>
-            <a:pPr algn="ctr"/>
-            <a:endParaRPr lang="de-DE"/>
-          </a:p>
-        </p:txBody>
-      </p:sp>
-      <p:sp>
-        <p:nvSpPr>
-          <p:cNvPr id="73" name="Rechteck 72">
-            <a:extLst>
-              <a:ext uri="{FF2B5EF4-FFF2-40B4-BE49-F238E27FC236}">
-                <a16:creationId xmlns:a16="http://schemas.microsoft.com/office/drawing/2014/main" id="{43669A33-30E3-4B3E-91EC-FE5122ECC7F9}"/>
-              </a:ext>
-            </a:extLst>
-          </p:cNvPr>
-          <p:cNvSpPr/>
-          <p:nvPr/>
-        </p:nvSpPr>
-        <p:spPr>
-          <a:xfrm>
-            <a:off x="2859405" y="642375"/>
-            <a:ext cx="480476" cy="543246"/>
-          </a:xfrm>
-          <a:prstGeom prst="rect">
-            <a:avLst/>
-          </a:prstGeom>
-          <a:solidFill>
-            <a:schemeClr val="accent3">
-              <a:alpha val="50000"/>
-            </a:schemeClr>
-          </a:solidFill>
-          <a:ln>
-            <a:noFill/>
-          </a:ln>
-        </p:spPr>
-        <p:style>
-          <a:lnRef idx="0">
-            <a:scrgbClr r="0" g="0" b="0"/>
-          </a:lnRef>
-          <a:fillRef idx="0">
-            <a:scrgbClr r="0" g="0" b="0"/>
-          </a:fillRef>
-          <a:effectRef idx="0">
-            <a:scrgbClr r="0" g="0" b="0"/>
-          </a:effectRef>
-          <a:fontRef idx="minor">
-            <a:schemeClr val="lt1"/>
-          </a:fontRef>
-        </p:style>
-        <p:txBody>
-          <a:bodyPr rtlCol="0" anchor="ctr"/>
-          <a:lstStyle/>
-          <a:p>
-            <a:pPr algn="ctr"/>
-            <a:endParaRPr lang="de-DE"/>
-          </a:p>
-        </p:txBody>
-      </p:sp>
-      <p:sp>
-        <p:nvSpPr>
-          <p:cNvPr id="74" name="Rechteck 73">
-            <a:extLst>
-              <a:ext uri="{FF2B5EF4-FFF2-40B4-BE49-F238E27FC236}">
-                <a16:creationId xmlns:a16="http://schemas.microsoft.com/office/drawing/2014/main" id="{54531EF2-DE05-4678-9756-EF56416A0736}"/>
-              </a:ext>
-            </a:extLst>
-          </p:cNvPr>
-          <p:cNvSpPr/>
-          <p:nvPr/>
-        </p:nvSpPr>
-        <p:spPr>
-          <a:xfrm>
-            <a:off x="4346533" y="642375"/>
-            <a:ext cx="492538" cy="543246"/>
-          </a:xfrm>
-          <a:prstGeom prst="rect">
-            <a:avLst/>
-          </a:prstGeom>
-          <a:solidFill>
-            <a:schemeClr val="accent3">
-              <a:alpha val="50000"/>
-            </a:schemeClr>
-          </a:solidFill>
-          <a:ln>
-            <a:noFill/>
-          </a:ln>
-        </p:spPr>
-        <p:style>
-          <a:lnRef idx="0">
-            <a:scrgbClr r="0" g="0" b="0"/>
-          </a:lnRef>
-          <a:fillRef idx="0">
-            <a:scrgbClr r="0" g="0" b="0"/>
-          </a:fillRef>
-          <a:effectRef idx="0">
-            <a:scrgbClr r="0" g="0" b="0"/>
-          </a:effectRef>
-          <a:fontRef idx="minor">
-            <a:schemeClr val="lt1"/>
-          </a:fontRef>
-        </p:style>
-        <p:txBody>
-          <a:bodyPr rtlCol="0" anchor="ctr"/>
-          <a:lstStyle/>
-          <a:p>
-            <a:pPr algn="ctr"/>
-            <a:endParaRPr lang="de-DE"/>
-          </a:p>
-        </p:txBody>
-      </p:sp>
-      <p:sp>
-        <p:nvSpPr>
-          <p:cNvPr id="75" name="Rechteck 74">
-            <a:extLst>
-              <a:ext uri="{FF2B5EF4-FFF2-40B4-BE49-F238E27FC236}">
-                <a16:creationId xmlns:a16="http://schemas.microsoft.com/office/drawing/2014/main" id="{A36BEEF2-B6E2-46AF-85CD-3229A0E435D0}"/>
-              </a:ext>
-            </a:extLst>
-          </p:cNvPr>
-          <p:cNvSpPr/>
-          <p:nvPr/>
-        </p:nvSpPr>
-        <p:spPr>
-          <a:xfrm>
-            <a:off x="4827009" y="642375"/>
-            <a:ext cx="480476" cy="543246"/>
-          </a:xfrm>
-          <a:prstGeom prst="rect">
-            <a:avLst/>
-          </a:prstGeom>
-          <a:solidFill>
-            <a:schemeClr val="accent3">
-              <a:alpha val="50000"/>
-            </a:schemeClr>
-          </a:solidFill>
-          <a:ln>
-            <a:noFill/>
-          </a:ln>
-        </p:spPr>
-        <p:style>
-          <a:lnRef idx="0">
-            <a:scrgbClr r="0" g="0" b="0"/>
-          </a:lnRef>
-          <a:fillRef idx="0">
-            <a:scrgbClr r="0" g="0" b="0"/>
-          </a:fillRef>
-          <a:effectRef idx="0">
-            <a:scrgbClr r="0" g="0" b="0"/>
-          </a:effectRef>
-          <a:fontRef idx="minor">
-            <a:schemeClr val="lt1"/>
-          </a:fontRef>
-        </p:style>
-        <p:txBody>
-          <a:bodyPr rtlCol="0" anchor="ctr"/>
-          <a:lstStyle/>
-          <a:p>
-            <a:pPr algn="ctr"/>
-            <a:endParaRPr lang="de-DE"/>
-          </a:p>
-        </p:txBody>
-      </p:sp>
-      <p:sp>
-        <p:nvSpPr>
-          <p:cNvPr id="76" name="Rechteck 75">
-            <a:extLst>
-              <a:ext uri="{FF2B5EF4-FFF2-40B4-BE49-F238E27FC236}">
-                <a16:creationId xmlns:a16="http://schemas.microsoft.com/office/drawing/2014/main" id="{8A14F68F-F1AD-4A1F-9EE4-63F9562BC08B}"/>
-              </a:ext>
-            </a:extLst>
-          </p:cNvPr>
-          <p:cNvSpPr/>
-          <p:nvPr/>
-        </p:nvSpPr>
-        <p:spPr>
-          <a:xfrm>
-            <a:off x="3347289" y="-284655"/>
-            <a:ext cx="480476" cy="543246"/>
-          </a:xfrm>
-          <a:prstGeom prst="rect">
-            <a:avLst/>
-          </a:prstGeom>
-          <a:solidFill>
-            <a:schemeClr val="accent3">
-              <a:alpha val="50000"/>
-            </a:schemeClr>
-          </a:solidFill>
-          <a:ln>
-            <a:noFill/>
-          </a:ln>
-        </p:spPr>
-        <p:style>
-          <a:lnRef idx="0">
-            <a:scrgbClr r="0" g="0" b="0"/>
-          </a:lnRef>
-          <a:fillRef idx="0">
-            <a:scrgbClr r="0" g="0" b="0"/>
-          </a:fillRef>
-          <a:effectRef idx="0">
-            <a:scrgbClr r="0" g="0" b="0"/>
-          </a:effectRef>
-          <a:fontRef idx="minor">
-            <a:schemeClr val="lt1"/>
-          </a:fontRef>
-        </p:style>
-        <p:txBody>
-          <a:bodyPr rtlCol="0" anchor="ctr"/>
-          <a:lstStyle/>
-          <a:p>
-            <a:pPr algn="ctr"/>
-            <a:endParaRPr lang="de-DE"/>
-          </a:p>
-        </p:txBody>
-      </p:sp>
-      <p:sp>
-        <p:nvSpPr>
-          <p:cNvPr id="77" name="Rechteck 76">
-            <a:extLst>
-              <a:ext uri="{FF2B5EF4-FFF2-40B4-BE49-F238E27FC236}">
-                <a16:creationId xmlns:a16="http://schemas.microsoft.com/office/drawing/2014/main" id="{21044944-8372-4D1A-B794-DDD4FB42D13B}"/>
-              </a:ext>
-            </a:extLst>
-          </p:cNvPr>
-          <p:cNvSpPr/>
-          <p:nvPr/>
-        </p:nvSpPr>
-        <p:spPr>
-          <a:xfrm>
-            <a:off x="2867299" y="-284655"/>
-            <a:ext cx="480476" cy="543246"/>
-          </a:xfrm>
-          <a:prstGeom prst="rect">
-            <a:avLst/>
-          </a:prstGeom>
-          <a:solidFill>
-            <a:schemeClr val="accent3">
-              <a:alpha val="50000"/>
-            </a:schemeClr>
-          </a:solidFill>
-          <a:ln>
-            <a:noFill/>
-          </a:ln>
-        </p:spPr>
-        <p:style>
-          <a:lnRef idx="0">
-            <a:scrgbClr r="0" g="0" b="0"/>
-          </a:lnRef>
-          <a:fillRef idx="0">
-            <a:scrgbClr r="0" g="0" b="0"/>
-          </a:fillRef>
-          <a:effectRef idx="0">
-            <a:scrgbClr r="0" g="0" b="0"/>
-          </a:effectRef>
-          <a:fontRef idx="minor">
-            <a:schemeClr val="lt1"/>
-          </a:fontRef>
-        </p:style>
-        <p:txBody>
-          <a:bodyPr rtlCol="0" anchor="ctr"/>
-          <a:lstStyle/>
-          <a:p>
-            <a:pPr algn="ctr"/>
-            <a:endParaRPr lang="de-DE"/>
-          </a:p>
-        </p:txBody>
-      </p:sp>
-      <p:sp>
-        <p:nvSpPr>
-          <p:cNvPr id="78" name="Rechteck 77">
-            <a:extLst>
-              <a:ext uri="{FF2B5EF4-FFF2-40B4-BE49-F238E27FC236}">
-                <a16:creationId xmlns:a16="http://schemas.microsoft.com/office/drawing/2014/main" id="{66527E0B-9EE1-475A-A65E-BE709237601B}"/>
-              </a:ext>
-            </a:extLst>
-          </p:cNvPr>
-          <p:cNvSpPr/>
-          <p:nvPr/>
-        </p:nvSpPr>
-        <p:spPr>
-          <a:xfrm>
-            <a:off x="4829604" y="-290768"/>
-            <a:ext cx="480476" cy="543246"/>
-          </a:xfrm>
-          <a:prstGeom prst="rect">
-            <a:avLst/>
-          </a:prstGeom>
-          <a:solidFill>
-            <a:schemeClr val="accent3">
-              <a:alpha val="50000"/>
-            </a:schemeClr>
-          </a:solidFill>
-          <a:ln>
-            <a:noFill/>
-          </a:ln>
-        </p:spPr>
-        <p:style>
-          <a:lnRef idx="0">
-            <a:scrgbClr r="0" g="0" b="0"/>
-          </a:lnRef>
-          <a:fillRef idx="0">
-            <a:scrgbClr r="0" g="0" b="0"/>
-          </a:fillRef>
-          <a:effectRef idx="0">
-            <a:scrgbClr r="0" g="0" b="0"/>
-          </a:effectRef>
-          <a:fontRef idx="minor">
-            <a:schemeClr val="lt1"/>
-          </a:fontRef>
-        </p:style>
-        <p:txBody>
-          <a:bodyPr rtlCol="0" anchor="ctr"/>
-          <a:lstStyle/>
-          <a:p>
-            <a:pPr algn="ctr"/>
-            <a:endParaRPr lang="de-DE"/>
-          </a:p>
-        </p:txBody>
-      </p:sp>
-      <p:sp>
-        <p:nvSpPr>
-          <p:cNvPr id="79" name="Rechteck 78">
-            <a:extLst>
-              <a:ext uri="{FF2B5EF4-FFF2-40B4-BE49-F238E27FC236}">
-                <a16:creationId xmlns:a16="http://schemas.microsoft.com/office/drawing/2014/main" id="{C6181569-E87E-4170-B454-A00A8D241484}"/>
-              </a:ext>
-            </a:extLst>
-          </p:cNvPr>
-          <p:cNvSpPr/>
-          <p:nvPr/>
-        </p:nvSpPr>
-        <p:spPr>
-          <a:xfrm>
-            <a:off x="4353488" y="-284655"/>
-            <a:ext cx="480476" cy="543246"/>
-          </a:xfrm>
-          <a:prstGeom prst="rect">
-            <a:avLst/>
-          </a:prstGeom>
-          <a:solidFill>
-            <a:schemeClr val="accent3">
-              <a:alpha val="50000"/>
-            </a:schemeClr>
-          </a:solidFill>
-          <a:ln>
-            <a:noFill/>
-          </a:ln>
-        </p:spPr>
-        <p:style>
-          <a:lnRef idx="0">
-            <a:scrgbClr r="0" g="0" b="0"/>
-          </a:lnRef>
-          <a:fillRef idx="0">
-            <a:scrgbClr r="0" g="0" b="0"/>
-          </a:fillRef>
-          <a:effectRef idx="0">
-            <a:scrgbClr r="0" g="0" b="0"/>
-          </a:effectRef>
-          <a:fontRef idx="minor">
-            <a:schemeClr val="lt1"/>
-          </a:fontRef>
-        </p:style>
-        <p:txBody>
-          <a:bodyPr rtlCol="0" anchor="ctr"/>
-          <a:lstStyle/>
-          <a:p>
-            <a:pPr algn="ctr"/>
-            <a:endParaRPr lang="de-DE"/>
-          </a:p>
-        </p:txBody>
-      </p:sp>
-      <p:sp>
-        <p:nvSpPr>
-          <p:cNvPr id="85" name="Ellipse 84">
-            <a:extLst>
-              <a:ext uri="{FF2B5EF4-FFF2-40B4-BE49-F238E27FC236}">
-                <a16:creationId xmlns:a16="http://schemas.microsoft.com/office/drawing/2014/main" id="{607EF35C-DC59-43EC-9375-A999491044A1}"/>
-              </a:ext>
-            </a:extLst>
-          </p:cNvPr>
-          <p:cNvSpPr/>
-          <p:nvPr/>
-        </p:nvSpPr>
-        <p:spPr>
-          <a:xfrm>
-            <a:off x="3498256" y="2977024"/>
+          <p:cNvPr id="86" name="Ellipse 85">
+            <a:extLst>
+              <a:ext uri="{FF2B5EF4-FFF2-40B4-BE49-F238E27FC236}">
+                <a16:creationId xmlns:a16="http://schemas.microsoft.com/office/drawing/2014/main" id="{46345110-5D4E-41DB-B168-49D97D0F3853}"/>
+              </a:ext>
+            </a:extLst>
+          </p:cNvPr>
+          <p:cNvSpPr/>
+          <p:nvPr/>
+        </p:nvSpPr>
+        <p:spPr>
+          <a:xfrm>
+            <a:off x="3104019" y="3343656"/>
             <a:ext cx="360000" cy="360000"/>
           </a:xfrm>
           <a:prstGeom prst="ellipse">
@@ -7439,19 +7385,19 @@
       </p:sp>
       <p:sp>
         <p:nvSpPr>
-          <p:cNvPr id="86" name="Ellipse 85">
-            <a:extLst>
-              <a:ext uri="{FF2B5EF4-FFF2-40B4-BE49-F238E27FC236}">
-                <a16:creationId xmlns:a16="http://schemas.microsoft.com/office/drawing/2014/main" id="{46345110-5D4E-41DB-B168-49D97D0F3853}"/>
-              </a:ext>
-            </a:extLst>
-          </p:cNvPr>
-          <p:cNvSpPr/>
-          <p:nvPr/>
-        </p:nvSpPr>
-        <p:spPr>
-          <a:xfrm>
-            <a:off x="3104019" y="3343656"/>
+          <p:cNvPr id="87" name="Ellipse 86">
+            <a:extLst>
+              <a:ext uri="{FF2B5EF4-FFF2-40B4-BE49-F238E27FC236}">
+                <a16:creationId xmlns:a16="http://schemas.microsoft.com/office/drawing/2014/main" id="{BB3BF803-77A4-469A-A617-9B850E0C1959}"/>
+              </a:ext>
+            </a:extLst>
+          </p:cNvPr>
+          <p:cNvSpPr/>
+          <p:nvPr/>
+        </p:nvSpPr>
+        <p:spPr>
+          <a:xfrm>
+            <a:off x="4386131" y="3034440"/>
             <a:ext cx="360000" cy="360000"/>
           </a:xfrm>
           <a:prstGeom prst="ellipse">
@@ -7493,19 +7439,19 @@
       </p:sp>
       <p:sp>
         <p:nvSpPr>
-          <p:cNvPr id="87" name="Ellipse 86">
-            <a:extLst>
-              <a:ext uri="{FF2B5EF4-FFF2-40B4-BE49-F238E27FC236}">
-                <a16:creationId xmlns:a16="http://schemas.microsoft.com/office/drawing/2014/main" id="{BB3BF803-77A4-469A-A617-9B850E0C1959}"/>
-              </a:ext>
-            </a:extLst>
-          </p:cNvPr>
-          <p:cNvSpPr/>
-          <p:nvPr/>
-        </p:nvSpPr>
-        <p:spPr>
-          <a:xfrm>
-            <a:off x="4386131" y="3034440"/>
+          <p:cNvPr id="88" name="Ellipse 87">
+            <a:extLst>
+              <a:ext uri="{FF2B5EF4-FFF2-40B4-BE49-F238E27FC236}">
+                <a16:creationId xmlns:a16="http://schemas.microsoft.com/office/drawing/2014/main" id="{5B391F43-A572-4AED-882D-F06C47C55AAF}"/>
+              </a:ext>
+            </a:extLst>
+          </p:cNvPr>
+          <p:cNvSpPr/>
+          <p:nvPr/>
+        </p:nvSpPr>
+        <p:spPr>
+          <a:xfrm>
+            <a:off x="3991894" y="3401072"/>
             <a:ext cx="360000" cy="360000"/>
           </a:xfrm>
           <a:prstGeom prst="ellipse">
@@ -7547,114 +7493,6 @@
       </p:sp>
       <p:sp>
         <p:nvSpPr>
-          <p:cNvPr id="88" name="Ellipse 87">
-            <a:extLst>
-              <a:ext uri="{FF2B5EF4-FFF2-40B4-BE49-F238E27FC236}">
-                <a16:creationId xmlns:a16="http://schemas.microsoft.com/office/drawing/2014/main" id="{5B391F43-A572-4AED-882D-F06C47C55AAF}"/>
-              </a:ext>
-            </a:extLst>
-          </p:cNvPr>
-          <p:cNvSpPr/>
-          <p:nvPr/>
-        </p:nvSpPr>
-        <p:spPr>
-          <a:xfrm>
-            <a:off x="3991894" y="3401072"/>
-            <a:ext cx="360000" cy="360000"/>
-          </a:xfrm>
-          <a:prstGeom prst="ellipse">
-            <a:avLst/>
-          </a:prstGeom>
-          <a:solidFill>
-            <a:srgbClr val="FF0000"/>
-          </a:solidFill>
-          <a:ln>
-            <a:solidFill>
-              <a:srgbClr val="FF0000"/>
-            </a:solidFill>
-          </a:ln>
-        </p:spPr>
-        <p:style>
-          <a:lnRef idx="2">
-            <a:schemeClr val="accent1">
-              <a:shade val="50000"/>
-            </a:schemeClr>
-          </a:lnRef>
-          <a:fillRef idx="1">
-            <a:schemeClr val="accent1"/>
-          </a:fillRef>
-          <a:effectRef idx="0">
-            <a:schemeClr val="accent1"/>
-          </a:effectRef>
-          <a:fontRef idx="minor">
-            <a:schemeClr val="lt1"/>
-          </a:fontRef>
-        </p:style>
-        <p:txBody>
-          <a:bodyPr rtlCol="0" anchor="ctr"/>
-          <a:lstStyle/>
-          <a:p>
-            <a:pPr algn="ctr"/>
-            <a:endParaRPr lang="de-DE"/>
-          </a:p>
-        </p:txBody>
-      </p:sp>
-      <p:sp>
-        <p:nvSpPr>
-          <p:cNvPr id="89" name="Ellipse 88">
-            <a:extLst>
-              <a:ext uri="{FF2B5EF4-FFF2-40B4-BE49-F238E27FC236}">
-                <a16:creationId xmlns:a16="http://schemas.microsoft.com/office/drawing/2014/main" id="{52EE450B-E3B8-4D05-9D79-D42E418A8FB5}"/>
-              </a:ext>
-            </a:extLst>
-          </p:cNvPr>
-          <p:cNvSpPr/>
-          <p:nvPr/>
-        </p:nvSpPr>
-        <p:spPr>
-          <a:xfrm>
-            <a:off x="6236420" y="5365237"/>
-            <a:ext cx="360000" cy="360000"/>
-          </a:xfrm>
-          <a:prstGeom prst="ellipse">
-            <a:avLst/>
-          </a:prstGeom>
-          <a:solidFill>
-            <a:srgbClr val="FF0000"/>
-          </a:solidFill>
-          <a:ln>
-            <a:solidFill>
-              <a:srgbClr val="FF0000"/>
-            </a:solidFill>
-          </a:ln>
-        </p:spPr>
-        <p:style>
-          <a:lnRef idx="2">
-            <a:schemeClr val="accent1">
-              <a:shade val="50000"/>
-            </a:schemeClr>
-          </a:lnRef>
-          <a:fillRef idx="1">
-            <a:schemeClr val="accent1"/>
-          </a:fillRef>
-          <a:effectRef idx="0">
-            <a:schemeClr val="accent1"/>
-          </a:effectRef>
-          <a:fontRef idx="minor">
-            <a:schemeClr val="lt1"/>
-          </a:fontRef>
-        </p:style>
-        <p:txBody>
-          <a:bodyPr rtlCol="0" anchor="ctr"/>
-          <a:lstStyle/>
-          <a:p>
-            <a:pPr algn="ctr"/>
-            <a:endParaRPr lang="de-DE"/>
-          </a:p>
-        </p:txBody>
-      </p:sp>
-      <p:sp>
-        <p:nvSpPr>
           <p:cNvPr id="90" name="Ellipse 89">
             <a:extLst>
               <a:ext uri="{FF2B5EF4-FFF2-40B4-BE49-F238E27FC236}">
@@ -7668,60 +7506,6 @@
         <p:spPr>
           <a:xfrm>
             <a:off x="5842183" y="5731869"/>
-            <a:ext cx="360000" cy="360000"/>
-          </a:xfrm>
-          <a:prstGeom prst="ellipse">
-            <a:avLst/>
-          </a:prstGeom>
-          <a:solidFill>
-            <a:srgbClr val="FF0000"/>
-          </a:solidFill>
-          <a:ln>
-            <a:solidFill>
-              <a:srgbClr val="FF0000"/>
-            </a:solidFill>
-          </a:ln>
-        </p:spPr>
-        <p:style>
-          <a:lnRef idx="2">
-            <a:schemeClr val="accent1">
-              <a:shade val="50000"/>
-            </a:schemeClr>
-          </a:lnRef>
-          <a:fillRef idx="1">
-            <a:schemeClr val="accent1"/>
-          </a:fillRef>
-          <a:effectRef idx="0">
-            <a:schemeClr val="accent1"/>
-          </a:effectRef>
-          <a:fontRef idx="minor">
-            <a:schemeClr val="lt1"/>
-          </a:fontRef>
-        </p:style>
-        <p:txBody>
-          <a:bodyPr rtlCol="0" anchor="ctr"/>
-          <a:lstStyle/>
-          <a:p>
-            <a:pPr algn="ctr"/>
-            <a:endParaRPr lang="de-DE"/>
-          </a:p>
-        </p:txBody>
-      </p:sp>
-      <p:sp>
-        <p:nvSpPr>
-          <p:cNvPr id="91" name="Ellipse 90">
-            <a:extLst>
-              <a:ext uri="{FF2B5EF4-FFF2-40B4-BE49-F238E27FC236}">
-                <a16:creationId xmlns:a16="http://schemas.microsoft.com/office/drawing/2014/main" id="{83571140-00C6-4C3A-9266-AEBFABD96EFC}"/>
-              </a:ext>
-            </a:extLst>
-          </p:cNvPr>
-          <p:cNvSpPr/>
-          <p:nvPr/>
-        </p:nvSpPr>
-        <p:spPr>
-          <a:xfrm>
-            <a:off x="6270180" y="1797138"/>
             <a:ext cx="360000" cy="360000"/>
           </a:xfrm>
           <a:prstGeom prst="ellipse">

</xml_diff>